<commit_message>
discovey lib final version
</commit_message>
<xml_diff>
--- a/entregables_hito_2/libreria_descubrimiento/ASIO_Presentación_Librería_Descubrimiento.pptx
+++ b/entregables_hito_2/libreria_descubrimiento/ASIO_Presentación_Librería_Descubrimiento.pptx
@@ -8,7 +8,7 @@
     <p:sldMasterId id="2147483697" r:id="rId7"/>
   </p:sldMasterIdLst>
   <p:notesMasterIdLst>
-    <p:notesMasterId r:id="rId22"/>
+    <p:notesMasterId r:id="rId21"/>
   </p:notesMasterIdLst>
   <p:sldIdLst>
     <p:sldId id="256" r:id="rId8"/>
@@ -22,9 +22,8 @@
     <p:sldId id="273" r:id="rId16"/>
     <p:sldId id="274" r:id="rId17"/>
     <p:sldId id="275" r:id="rId18"/>
-    <p:sldId id="276" r:id="rId19"/>
-    <p:sldId id="277" r:id="rId20"/>
-    <p:sldId id="258" r:id="rId21"/>
+    <p:sldId id="277" r:id="rId19"/>
+    <p:sldId id="258" r:id="rId20"/>
   </p:sldIdLst>
   <p:sldSz cx="12192000" cy="6858000"/>
   <p:notesSz cx="6858000" cy="9144000"/>
@@ -139,7 +138,6 @@
             <p14:sldId id="273"/>
             <p14:sldId id="274"/>
             <p14:sldId id="275"/>
-            <p14:sldId id="276"/>
             <p14:sldId id="277"/>
             <p14:sldId id="258"/>
           </p14:sldIdLst>
@@ -238,7 +236,7 @@
           <a:p>
             <a:fld id="{161B3F03-733C-4F4F-8160-EA6766E3B12A}" type="datetimeFigureOut">
               <a:rPr lang="es-ES" smtClean="0"/>
-              <a:t>22/09/2020</a:t>
+              <a:t>23/09/2020</a:t>
             </a:fld>
             <a:endParaRPr lang="es-ES"/>
           </a:p>
@@ -505,6 +503,1273 @@
 </p:notesMaster>
 </file>
 
+<file path=ppt/notesSlides/notesSlide1.xml><?xml version="1.0" encoding="utf-8"?>
+<p:notes xmlns:a="http://schemas.openxmlformats.org/drawingml/2006/main" xmlns:r="http://schemas.openxmlformats.org/officeDocument/2006/relationships" xmlns:p="http://schemas.openxmlformats.org/presentationml/2006/main">
+  <p:cSld>
+    <p:spTree>
+      <p:nvGrpSpPr>
+        <p:cNvPr id="1" name=""/>
+        <p:cNvGrpSpPr/>
+        <p:nvPr/>
+      </p:nvGrpSpPr>
+      <p:grpSpPr>
+        <a:xfrm>
+          <a:off x="0" y="0"/>
+          <a:ext cx="0" cy="0"/>
+          <a:chOff x="0" y="0"/>
+          <a:chExt cx="0" cy="0"/>
+        </a:xfrm>
+      </p:grpSpPr>
+      <p:sp>
+        <p:nvSpPr>
+          <p:cNvPr id="2" name="Marcador de imagen de diapositiva 1"/>
+          <p:cNvSpPr>
+            <a:spLocks noGrp="1" noRot="1" noChangeAspect="1"/>
+          </p:cNvSpPr>
+          <p:nvPr>
+            <p:ph type="sldImg"/>
+          </p:nvPr>
+        </p:nvSpPr>
+        <p:spPr/>
+      </p:sp>
+      <p:sp>
+        <p:nvSpPr>
+          <p:cNvPr id="3" name="Marcador de notas 2"/>
+          <p:cNvSpPr>
+            <a:spLocks noGrp="1"/>
+          </p:cNvSpPr>
+          <p:nvPr>
+            <p:ph type="body" idx="1"/>
+          </p:nvPr>
+        </p:nvSpPr>
+        <p:spPr/>
+        <p:txBody>
+          <a:bodyPr/>
+          <a:lstStyle/>
+          <a:p>
+            <a:r>
+              <a:rPr lang="es-ES" dirty="0"/>
+              <a:t>La librería de descubrimiento esta compuesta por distintos módulos con finalidades muy distintas:</a:t>
+            </a:r>
+          </a:p>
+          <a:p>
+            <a:pPr marL="171450" indent="-171450">
+              <a:buFontTx/>
+              <a:buChar char="-"/>
+            </a:pPr>
+            <a:r>
+              <a:rPr lang="es-ES" dirty="0"/>
+              <a:t>Reconciliación de entidades </a:t>
+            </a:r>
+            <a:r>
+              <a:rPr lang="es-ES" dirty="0">
+                <a:sym typeface="Wingdings" panose="05000000000000000000" pitchFamily="2" charset="2"/>
+              </a:rPr>
+              <a:t></a:t>
+            </a:r>
+            <a:r>
+              <a:rPr lang="es-ES" dirty="0"/>
+              <a:t> (dentro de un mismo Backend). Realiza la detección de duplicados o instancias que referencian el mismo concepto y coordina el proceso de merge o </a:t>
+            </a:r>
+            <a:r>
+              <a:rPr lang="es-ES"/>
+              <a:t>linkado</a:t>
+            </a:r>
+            <a:endParaRPr lang="es-ES" dirty="0"/>
+          </a:p>
+          <a:p>
+            <a:pPr marL="171450" indent="-171450">
+              <a:buFontTx/>
+              <a:buChar char="-"/>
+            </a:pPr>
+            <a:r>
+              <a:rPr lang="es-ES" dirty="0"/>
+              <a:t>Descubrimiento de enlaces </a:t>
+            </a:r>
+            <a:r>
+              <a:rPr lang="es-ES" dirty="0">
+                <a:sym typeface="Wingdings" panose="05000000000000000000" pitchFamily="2" charset="2"/>
+              </a:rPr>
+              <a:t></a:t>
+            </a:r>
+            <a:r>
+              <a:rPr lang="es-ES" dirty="0"/>
+              <a:t> Instancias externas al </a:t>
+            </a:r>
+            <a:r>
+              <a:rPr lang="es-ES" dirty="0" err="1"/>
+              <a:t>Bacend</a:t>
+            </a:r>
+            <a:r>
+              <a:rPr lang="es-ES" dirty="0"/>
+              <a:t> SGI. Tiene como finalidad añadir enlaces entre instancias</a:t>
+            </a:r>
+          </a:p>
+          <a:p>
+            <a:pPr marL="628650" lvl="1" indent="-171450">
+              <a:buFontTx/>
+              <a:buChar char="-"/>
+            </a:pPr>
+            <a:r>
+              <a:rPr lang="es-ES" dirty="0"/>
+              <a:t>Otros Backend SGI.</a:t>
+            </a:r>
+          </a:p>
+          <a:p>
+            <a:pPr marL="628650" lvl="1" indent="-171450">
+              <a:buFontTx/>
+              <a:buChar char="-"/>
+            </a:pPr>
+            <a:r>
+              <a:rPr lang="es-ES" dirty="0"/>
+              <a:t>La Nube LOD</a:t>
+            </a:r>
+          </a:p>
+          <a:p>
+            <a:pPr marL="171450" lvl="0" indent="-171450">
+              <a:buFontTx/>
+              <a:buChar char="-"/>
+            </a:pPr>
+            <a:r>
+              <a:rPr lang="es-ES" dirty="0"/>
+              <a:t>Detección de equivalencias </a:t>
+            </a:r>
+            <a:r>
+              <a:rPr lang="es-ES" dirty="0">
+                <a:sym typeface="Wingdings" panose="05000000000000000000" pitchFamily="2" charset="2"/>
+              </a:rPr>
+              <a:t> Usando razonamiento automático</a:t>
+            </a:r>
+            <a:endParaRPr lang="es-ES" dirty="0"/>
+          </a:p>
+          <a:p>
+            <a:pPr marL="628650" lvl="1" indent="-171450">
+              <a:buFontTx/>
+              <a:buChar char="-"/>
+            </a:pPr>
+            <a:endParaRPr lang="es-ES" dirty="0"/>
+          </a:p>
+        </p:txBody>
+      </p:sp>
+      <p:sp>
+        <p:nvSpPr>
+          <p:cNvPr id="4" name="Marcador de número de diapositiva 3"/>
+          <p:cNvSpPr>
+            <a:spLocks noGrp="1"/>
+          </p:cNvSpPr>
+          <p:nvPr>
+            <p:ph type="sldNum" sz="quarter" idx="5"/>
+          </p:nvPr>
+        </p:nvSpPr>
+        <p:spPr/>
+        <p:txBody>
+          <a:bodyPr/>
+          <a:lstStyle/>
+          <a:p>
+            <a:fld id="{EBE0464F-B7A6-41EA-9FCA-FF947132E9B8}" type="slidenum">
+              <a:rPr lang="es-ES" smtClean="0"/>
+              <a:t>2</a:t>
+            </a:fld>
+            <a:endParaRPr lang="es-ES"/>
+          </a:p>
+        </p:txBody>
+      </p:sp>
+    </p:spTree>
+    <p:extLst>
+      <p:ext uri="{BB962C8B-B14F-4D97-AF65-F5344CB8AC3E}">
+        <p14:creationId xmlns:p14="http://schemas.microsoft.com/office/powerpoint/2010/main" val="3497683101"/>
+      </p:ext>
+    </p:extLst>
+  </p:cSld>
+  <p:clrMapOvr>
+    <a:masterClrMapping/>
+  </p:clrMapOvr>
+</p:notes>
+</file>
+
+<file path=ppt/notesSlides/notesSlide2.xml><?xml version="1.0" encoding="utf-8"?>
+<p:notes xmlns:a="http://schemas.openxmlformats.org/drawingml/2006/main" xmlns:r="http://schemas.openxmlformats.org/officeDocument/2006/relationships" xmlns:p="http://schemas.openxmlformats.org/presentationml/2006/main">
+  <p:cSld>
+    <p:spTree>
+      <p:nvGrpSpPr>
+        <p:cNvPr id="1" name=""/>
+        <p:cNvGrpSpPr/>
+        <p:nvPr/>
+      </p:nvGrpSpPr>
+      <p:grpSpPr>
+        <a:xfrm>
+          <a:off x="0" y="0"/>
+          <a:ext cx="0" cy="0"/>
+          <a:chOff x="0" y="0"/>
+          <a:chExt cx="0" cy="0"/>
+        </a:xfrm>
+      </p:grpSpPr>
+      <p:sp>
+        <p:nvSpPr>
+          <p:cNvPr id="2" name="Marcador de imagen de diapositiva 1"/>
+          <p:cNvSpPr>
+            <a:spLocks noGrp="1" noRot="1" noChangeAspect="1"/>
+          </p:cNvSpPr>
+          <p:nvPr>
+            <p:ph type="sldImg"/>
+          </p:nvPr>
+        </p:nvSpPr>
+        <p:spPr/>
+      </p:sp>
+      <p:sp>
+        <p:nvSpPr>
+          <p:cNvPr id="3" name="Marcador de notas 2"/>
+          <p:cNvSpPr>
+            <a:spLocks noGrp="1"/>
+          </p:cNvSpPr>
+          <p:nvPr>
+            <p:ph type="body" idx="1"/>
+          </p:nvPr>
+        </p:nvSpPr>
+        <p:spPr/>
+        <p:txBody>
+          <a:bodyPr/>
+          <a:lstStyle/>
+          <a:p>
+            <a:r>
+              <a:rPr lang="es-ES" dirty="0"/>
+              <a:t>En este punto describimos el diseño y la implementación de la solución para la reconciliación de entidades y descubrimiento de enlaces, dentro del propio Backend SGI y entre distintos Backends SGI.</a:t>
+            </a:r>
+          </a:p>
+          <a:p>
+            <a:r>
+              <a:rPr lang="es-ES" dirty="0"/>
+              <a:t>En paralelo estamos estudiando soluciones para el descubrimiento de enlaces en al Nube LOD (que seguirá un diseño similar, pero probablemente necesite un modulo de extra de identificación de entidades) y detección de equivalencias (que al usar razonamiento automático, y tener pocos nexos en común con los descritos anteriormente, probablemente se diseñe en un modulo a parte)</a:t>
+            </a:r>
+          </a:p>
+          <a:p>
+            <a:pPr marL="171450" indent="-171450">
+              <a:buFontTx/>
+              <a:buChar char="-"/>
+            </a:pPr>
+            <a:endParaRPr lang="es-ES" dirty="0"/>
+          </a:p>
+        </p:txBody>
+      </p:sp>
+      <p:sp>
+        <p:nvSpPr>
+          <p:cNvPr id="4" name="Marcador de número de diapositiva 3"/>
+          <p:cNvSpPr>
+            <a:spLocks noGrp="1"/>
+          </p:cNvSpPr>
+          <p:nvPr>
+            <p:ph type="sldNum" sz="quarter" idx="5"/>
+          </p:nvPr>
+        </p:nvSpPr>
+        <p:spPr/>
+        <p:txBody>
+          <a:bodyPr/>
+          <a:lstStyle/>
+          <a:p>
+            <a:fld id="{EBE0464F-B7A6-41EA-9FCA-FF947132E9B8}" type="slidenum">
+              <a:rPr lang="es-ES" smtClean="0"/>
+              <a:t>3</a:t>
+            </a:fld>
+            <a:endParaRPr lang="es-ES"/>
+          </a:p>
+        </p:txBody>
+      </p:sp>
+    </p:spTree>
+    <p:extLst>
+      <p:ext uri="{BB962C8B-B14F-4D97-AF65-F5344CB8AC3E}">
+        <p14:creationId xmlns:p14="http://schemas.microsoft.com/office/powerpoint/2010/main" val="4012601697"/>
+      </p:ext>
+    </p:extLst>
+  </p:cSld>
+  <p:clrMapOvr>
+    <a:masterClrMapping/>
+  </p:clrMapOvr>
+</p:notes>
+</file>
+
+<file path=ppt/notesSlides/notesSlide3.xml><?xml version="1.0" encoding="utf-8"?>
+<p:notes xmlns:a="http://schemas.openxmlformats.org/drawingml/2006/main" xmlns:r="http://schemas.openxmlformats.org/officeDocument/2006/relationships" xmlns:p="http://schemas.openxmlformats.org/presentationml/2006/main">
+  <p:cSld>
+    <p:spTree>
+      <p:nvGrpSpPr>
+        <p:cNvPr id="1" name=""/>
+        <p:cNvGrpSpPr/>
+        <p:nvPr/>
+      </p:nvGrpSpPr>
+      <p:grpSpPr>
+        <a:xfrm>
+          <a:off x="0" y="0"/>
+          <a:ext cx="0" cy="0"/>
+          <a:chOff x="0" y="0"/>
+          <a:chExt cx="0" cy="0"/>
+        </a:xfrm>
+      </p:grpSpPr>
+      <p:sp>
+        <p:nvSpPr>
+          <p:cNvPr id="2" name="Marcador de imagen de diapositiva 1"/>
+          <p:cNvSpPr>
+            <a:spLocks noGrp="1" noRot="1" noChangeAspect="1"/>
+          </p:cNvSpPr>
+          <p:nvPr>
+            <p:ph type="sldImg"/>
+          </p:nvPr>
+        </p:nvSpPr>
+        <p:spPr/>
+      </p:sp>
+      <p:sp>
+        <p:nvSpPr>
+          <p:cNvPr id="3" name="Marcador de notas 2"/>
+          <p:cNvSpPr>
+            <a:spLocks noGrp="1"/>
+          </p:cNvSpPr>
+          <p:nvPr>
+            <p:ph type="body" idx="1"/>
+          </p:nvPr>
+        </p:nvSpPr>
+        <p:spPr/>
+        <p:txBody>
+          <a:bodyPr/>
+          <a:lstStyle/>
+          <a:p>
+            <a:r>
+              <a:rPr lang="es-ES" dirty="0"/>
+              <a:t>Estado del Arte</a:t>
+            </a:r>
+          </a:p>
+          <a:p>
+            <a:r>
+              <a:rPr lang="es-ES" dirty="0"/>
+              <a:t>-----------------</a:t>
+            </a:r>
+          </a:p>
+          <a:p>
+            <a:pPr marL="171450" indent="-171450">
+              <a:buFontTx/>
+              <a:buChar char="-"/>
+            </a:pPr>
+            <a:r>
+              <a:rPr lang="es-ES" dirty="0"/>
+              <a:t>Rama de investigación activa y abierta</a:t>
+            </a:r>
+          </a:p>
+          <a:p>
+            <a:pPr marL="171450" indent="-171450">
+              <a:buFontTx/>
+              <a:buChar char="-"/>
+            </a:pPr>
+            <a:r>
+              <a:rPr lang="es-ES" dirty="0"/>
+              <a:t>No trivial</a:t>
+            </a:r>
+          </a:p>
+          <a:p>
+            <a:pPr marL="628650" lvl="1" indent="-171450">
+              <a:buFontTx/>
+              <a:buChar char="-"/>
+            </a:pPr>
+            <a:r>
+              <a:rPr lang="es-ES" dirty="0"/>
+              <a:t>Distintas representaciones para valores equivalentes</a:t>
+            </a:r>
+          </a:p>
+          <a:p>
+            <a:pPr marL="628650" lvl="1" indent="-171450">
+              <a:buFontTx/>
+              <a:buChar char="-"/>
+            </a:pPr>
+            <a:r>
+              <a:rPr lang="es-ES" dirty="0"/>
+              <a:t>Distintos tipos de datos y por tanto distintos tipos de evaluaciones de similitud</a:t>
+            </a:r>
+          </a:p>
+          <a:p>
+            <a:pPr marL="628650" lvl="1" indent="-171450">
+              <a:buFontTx/>
+              <a:buChar char="-"/>
+            </a:pPr>
+            <a:r>
+              <a:rPr lang="es-ES" dirty="0"/>
+              <a:t>Distinta importancia de los atributos a la hora de identificar una entidad</a:t>
+            </a:r>
+          </a:p>
+          <a:p>
+            <a:pPr marL="628650" lvl="1" indent="-171450">
+              <a:buFontTx/>
+              <a:buChar char="-"/>
+            </a:pPr>
+            <a:endParaRPr lang="es-ES" dirty="0"/>
+          </a:p>
+          <a:p>
+            <a:pPr marL="0" lvl="0" indent="0">
+              <a:buFontTx/>
+              <a:buNone/>
+            </a:pPr>
+            <a:r>
+              <a:rPr lang="es-ES" dirty="0"/>
+              <a:t>Objetivos para el proyecto ASIO</a:t>
+            </a:r>
+          </a:p>
+          <a:p>
+            <a:pPr marL="0" lvl="0" indent="0">
+              <a:buFontTx/>
+              <a:buNone/>
+            </a:pPr>
+            <a:r>
+              <a:rPr lang="es-ES" dirty="0"/>
+              <a:t>------------------------------------</a:t>
+            </a:r>
+          </a:p>
+          <a:p>
+            <a:pPr marL="171450" lvl="0" indent="-171450">
+              <a:buFontTx/>
+              <a:buChar char="-"/>
+            </a:pPr>
+            <a:r>
+              <a:rPr lang="es-ES" dirty="0"/>
+              <a:t>Evitar duplicados</a:t>
+            </a:r>
+          </a:p>
+          <a:p>
+            <a:pPr marL="171450" lvl="0" indent="-171450">
+              <a:buFontTx/>
+              <a:buChar char="-"/>
+            </a:pPr>
+            <a:r>
+              <a:rPr lang="es-ES" dirty="0"/>
+              <a:t>Crear enlaces entre distintas entidades de distintos Backend SGI que representan un mismo concepto</a:t>
+            </a:r>
+          </a:p>
+          <a:p>
+            <a:pPr marL="171450" lvl="0" indent="-171450">
+              <a:buFontTx/>
+              <a:buChar char="-"/>
+            </a:pPr>
+            <a:r>
+              <a:rPr lang="es-ES" dirty="0"/>
+              <a:t>Minimizar la intervención humana estableciendo 2 umbrales:</a:t>
+            </a:r>
+          </a:p>
+          <a:p>
+            <a:pPr marL="628650" lvl="1" indent="-171450">
+              <a:buFontTx/>
+              <a:buChar char="-"/>
+            </a:pPr>
+            <a:r>
+              <a:rPr lang="es-ES" dirty="0"/>
+              <a:t>Actuación automática.</a:t>
+            </a:r>
+          </a:p>
+          <a:p>
+            <a:pPr marL="628650" lvl="1" indent="-171450">
+              <a:buFontTx/>
+              <a:buChar char="-"/>
+            </a:pPr>
+            <a:r>
+              <a:rPr lang="es-ES" dirty="0"/>
+              <a:t>Informar a supervisor humano, para decidir si fusionar la entidad o no.</a:t>
+            </a:r>
+          </a:p>
+          <a:p>
+            <a:pPr marL="628650" lvl="1" indent="-171450">
+              <a:buFontTx/>
+              <a:buChar char="-"/>
+            </a:pPr>
+            <a:endParaRPr lang="es-ES" dirty="0"/>
+          </a:p>
+        </p:txBody>
+      </p:sp>
+      <p:sp>
+        <p:nvSpPr>
+          <p:cNvPr id="4" name="Marcador de número de diapositiva 3"/>
+          <p:cNvSpPr>
+            <a:spLocks noGrp="1"/>
+          </p:cNvSpPr>
+          <p:nvPr>
+            <p:ph type="sldNum" sz="quarter" idx="5"/>
+          </p:nvPr>
+        </p:nvSpPr>
+        <p:spPr/>
+        <p:txBody>
+          <a:bodyPr/>
+          <a:lstStyle/>
+          <a:p>
+            <a:fld id="{EBE0464F-B7A6-41EA-9FCA-FF947132E9B8}" type="slidenum">
+              <a:rPr lang="es-ES" smtClean="0"/>
+              <a:t>4</a:t>
+            </a:fld>
+            <a:endParaRPr lang="es-ES"/>
+          </a:p>
+        </p:txBody>
+      </p:sp>
+    </p:spTree>
+    <p:extLst>
+      <p:ext uri="{BB962C8B-B14F-4D97-AF65-F5344CB8AC3E}">
+        <p14:creationId xmlns:p14="http://schemas.microsoft.com/office/powerpoint/2010/main" val="3782539334"/>
+      </p:ext>
+    </p:extLst>
+  </p:cSld>
+  <p:clrMapOvr>
+    <a:masterClrMapping/>
+  </p:clrMapOvr>
+</p:notes>
+</file>
+
+<file path=ppt/notesSlides/notesSlide4.xml><?xml version="1.0" encoding="utf-8"?>
+<p:notes xmlns:a="http://schemas.openxmlformats.org/drawingml/2006/main" xmlns:r="http://schemas.openxmlformats.org/officeDocument/2006/relationships" xmlns:p="http://schemas.openxmlformats.org/presentationml/2006/main">
+  <p:cSld>
+    <p:spTree>
+      <p:nvGrpSpPr>
+        <p:cNvPr id="1" name=""/>
+        <p:cNvGrpSpPr/>
+        <p:nvPr/>
+      </p:nvGrpSpPr>
+      <p:grpSpPr>
+        <a:xfrm>
+          <a:off x="0" y="0"/>
+          <a:ext cx="0" cy="0"/>
+          <a:chOff x="0" y="0"/>
+          <a:chExt cx="0" cy="0"/>
+        </a:xfrm>
+      </p:grpSpPr>
+      <p:sp>
+        <p:nvSpPr>
+          <p:cNvPr id="2" name="Marcador de imagen de diapositiva 1"/>
+          <p:cNvSpPr>
+            <a:spLocks noGrp="1" noRot="1" noChangeAspect="1"/>
+          </p:cNvSpPr>
+          <p:nvPr>
+            <p:ph type="sldImg"/>
+          </p:nvPr>
+        </p:nvSpPr>
+        <p:spPr/>
+      </p:sp>
+      <p:sp>
+        <p:nvSpPr>
+          <p:cNvPr id="3" name="Marcador de notas 2"/>
+          <p:cNvSpPr>
+            <a:spLocks noGrp="1"/>
+          </p:cNvSpPr>
+          <p:nvPr>
+            <p:ph type="body" idx="1"/>
+          </p:nvPr>
+        </p:nvSpPr>
+        <p:spPr/>
+        <p:txBody>
+          <a:bodyPr/>
+          <a:lstStyle/>
+          <a:p>
+            <a:endParaRPr lang="es-ES" dirty="0"/>
+          </a:p>
+        </p:txBody>
+      </p:sp>
+      <p:sp>
+        <p:nvSpPr>
+          <p:cNvPr id="4" name="Marcador de número de diapositiva 3"/>
+          <p:cNvSpPr>
+            <a:spLocks noGrp="1"/>
+          </p:cNvSpPr>
+          <p:nvPr>
+            <p:ph type="sldNum" sz="quarter" idx="5"/>
+          </p:nvPr>
+        </p:nvSpPr>
+        <p:spPr/>
+        <p:txBody>
+          <a:bodyPr/>
+          <a:lstStyle/>
+          <a:p>
+            <a:fld id="{EBE0464F-B7A6-41EA-9FCA-FF947132E9B8}" type="slidenum">
+              <a:rPr lang="es-ES" smtClean="0"/>
+              <a:t>5</a:t>
+            </a:fld>
+            <a:endParaRPr lang="es-ES"/>
+          </a:p>
+        </p:txBody>
+      </p:sp>
+    </p:spTree>
+    <p:extLst>
+      <p:ext uri="{BB962C8B-B14F-4D97-AF65-F5344CB8AC3E}">
+        <p14:creationId xmlns:p14="http://schemas.microsoft.com/office/powerpoint/2010/main" val="3803884004"/>
+      </p:ext>
+    </p:extLst>
+  </p:cSld>
+  <p:clrMapOvr>
+    <a:masterClrMapping/>
+  </p:clrMapOvr>
+</p:notes>
+</file>
+
+<file path=ppt/notesSlides/notesSlide5.xml><?xml version="1.0" encoding="utf-8"?>
+<p:notes xmlns:a="http://schemas.openxmlformats.org/drawingml/2006/main" xmlns:r="http://schemas.openxmlformats.org/officeDocument/2006/relationships" xmlns:p="http://schemas.openxmlformats.org/presentationml/2006/main">
+  <p:cSld>
+    <p:spTree>
+      <p:nvGrpSpPr>
+        <p:cNvPr id="1" name=""/>
+        <p:cNvGrpSpPr/>
+        <p:nvPr/>
+      </p:nvGrpSpPr>
+      <p:grpSpPr>
+        <a:xfrm>
+          <a:off x="0" y="0"/>
+          <a:ext cx="0" cy="0"/>
+          <a:chOff x="0" y="0"/>
+          <a:chExt cx="0" cy="0"/>
+        </a:xfrm>
+      </p:grpSpPr>
+      <p:sp>
+        <p:nvSpPr>
+          <p:cNvPr id="2" name="Marcador de imagen de diapositiva 1"/>
+          <p:cNvSpPr>
+            <a:spLocks noGrp="1" noRot="1" noChangeAspect="1"/>
+          </p:cNvSpPr>
+          <p:nvPr>
+            <p:ph type="sldImg"/>
+          </p:nvPr>
+        </p:nvSpPr>
+        <p:spPr/>
+      </p:sp>
+      <p:sp>
+        <p:nvSpPr>
+          <p:cNvPr id="3" name="Marcador de notas 2"/>
+          <p:cNvSpPr>
+            <a:spLocks noGrp="1"/>
+          </p:cNvSpPr>
+          <p:nvPr>
+            <p:ph type="body" idx="1"/>
+          </p:nvPr>
+        </p:nvSpPr>
+        <p:spPr/>
+        <p:txBody>
+          <a:bodyPr/>
+          <a:lstStyle/>
+          <a:p>
+            <a:r>
+              <a:rPr lang="es-ES" dirty="0"/>
+              <a:t>Tipo de mayor importancia, ya que es el tipo más general: todos los tipos de datos descritos después, pueden ser también evaluados como cadenas de texto</a:t>
+            </a:r>
+          </a:p>
+          <a:p>
+            <a:endParaRPr lang="es-ES" dirty="0"/>
+          </a:p>
+          <a:p>
+            <a:r>
+              <a:rPr lang="es-ES" dirty="0"/>
+              <a:t>Existen varios tipos de variaciones frecuentes:</a:t>
+            </a:r>
+          </a:p>
+          <a:p>
+            <a:pPr marL="171450" indent="-171450">
+              <a:buFontTx/>
+              <a:buChar char="-"/>
+            </a:pPr>
+            <a:r>
+              <a:rPr lang="es-ES" dirty="0"/>
+              <a:t>Cambio de orden en palabras, probablemente pode distintas convenciones</a:t>
+            </a:r>
+          </a:p>
+          <a:p>
+            <a:pPr marL="171450" indent="-171450">
+              <a:buFontTx/>
+              <a:buChar char="-"/>
+            </a:pPr>
+            <a:r>
+              <a:rPr lang="es-ES" dirty="0"/>
+              <a:t>Truncado de palabras por el uso de abreviaturas</a:t>
+            </a:r>
+          </a:p>
+          <a:p>
+            <a:pPr marL="171450" indent="-171450">
+              <a:buFontTx/>
+              <a:buChar char="-"/>
+            </a:pPr>
+            <a:r>
+              <a:rPr lang="es-ES" dirty="0"/>
+              <a:t>Errores o cambios ortográficos</a:t>
+            </a:r>
+          </a:p>
+          <a:p>
+            <a:pPr marL="171450" indent="-171450">
+              <a:buFontTx/>
+              <a:buChar char="-"/>
+            </a:pPr>
+            <a:endParaRPr lang="es-ES" dirty="0"/>
+          </a:p>
+          <a:p>
+            <a:pPr marL="0" indent="0">
+              <a:buFontTx/>
+              <a:buNone/>
+            </a:pPr>
+            <a:r>
+              <a:rPr lang="es-ES" dirty="0"/>
+              <a:t>Es necesario normalizar las cadenas de texto para reducir la complejidad</a:t>
+            </a:r>
+          </a:p>
+          <a:p>
+            <a:pPr marL="171450" indent="-171450">
+              <a:buFontTx/>
+              <a:buChar char="-"/>
+            </a:pPr>
+            <a:r>
+              <a:rPr lang="es-ES" dirty="0"/>
+              <a:t>No discriminado entre mayúsculas y minúsculas, ya que esto no representa información útil.</a:t>
+            </a:r>
+          </a:p>
+          <a:p>
+            <a:pPr marL="171450" indent="-171450">
+              <a:buFontTx/>
+              <a:buChar char="-"/>
+            </a:pPr>
+            <a:r>
+              <a:rPr lang="es-ES" dirty="0"/>
+              <a:t>Eliminación de caracteres de puntuación, signos gramaticales, acentos ….</a:t>
+            </a:r>
+          </a:p>
+          <a:p>
+            <a:pPr marL="171450" indent="-171450">
+              <a:buFontTx/>
+              <a:buChar char="-"/>
+            </a:pPr>
+            <a:r>
+              <a:rPr lang="es-ES" dirty="0"/>
+              <a:t>Tokenización</a:t>
+            </a:r>
+          </a:p>
+        </p:txBody>
+      </p:sp>
+      <p:sp>
+        <p:nvSpPr>
+          <p:cNvPr id="4" name="Marcador de número de diapositiva 3"/>
+          <p:cNvSpPr>
+            <a:spLocks noGrp="1"/>
+          </p:cNvSpPr>
+          <p:nvPr>
+            <p:ph type="sldNum" sz="quarter" idx="5"/>
+          </p:nvPr>
+        </p:nvSpPr>
+        <p:spPr/>
+        <p:txBody>
+          <a:bodyPr/>
+          <a:lstStyle/>
+          <a:p>
+            <a:fld id="{EBE0464F-B7A6-41EA-9FCA-FF947132E9B8}" type="slidenum">
+              <a:rPr lang="es-ES" smtClean="0"/>
+              <a:t>7</a:t>
+            </a:fld>
+            <a:endParaRPr lang="es-ES"/>
+          </a:p>
+        </p:txBody>
+      </p:sp>
+    </p:spTree>
+    <p:extLst>
+      <p:ext uri="{BB962C8B-B14F-4D97-AF65-F5344CB8AC3E}">
+        <p14:creationId xmlns:p14="http://schemas.microsoft.com/office/powerpoint/2010/main" val="4069890411"/>
+      </p:ext>
+    </p:extLst>
+  </p:cSld>
+  <p:clrMapOvr>
+    <a:masterClrMapping/>
+  </p:clrMapOvr>
+</p:notes>
+</file>
+
+<file path=ppt/notesSlides/notesSlide6.xml><?xml version="1.0" encoding="utf-8"?>
+<p:notes xmlns:a="http://schemas.openxmlformats.org/drawingml/2006/main" xmlns:r="http://schemas.openxmlformats.org/officeDocument/2006/relationships" xmlns:p="http://schemas.openxmlformats.org/presentationml/2006/main">
+  <p:cSld>
+    <p:spTree>
+      <p:nvGrpSpPr>
+        <p:cNvPr id="1" name=""/>
+        <p:cNvGrpSpPr/>
+        <p:nvPr/>
+      </p:nvGrpSpPr>
+      <p:grpSpPr>
+        <a:xfrm>
+          <a:off x="0" y="0"/>
+          <a:ext cx="0" cy="0"/>
+          <a:chOff x="0" y="0"/>
+          <a:chExt cx="0" cy="0"/>
+        </a:xfrm>
+      </p:grpSpPr>
+      <p:sp>
+        <p:nvSpPr>
+          <p:cNvPr id="2" name="Marcador de imagen de diapositiva 1"/>
+          <p:cNvSpPr>
+            <a:spLocks noGrp="1" noRot="1" noChangeAspect="1"/>
+          </p:cNvSpPr>
+          <p:nvPr>
+            <p:ph type="sldImg"/>
+          </p:nvPr>
+        </p:nvSpPr>
+        <p:spPr/>
+      </p:sp>
+      <p:sp>
+        <p:nvSpPr>
+          <p:cNvPr id="3" name="Marcador de notas 2"/>
+          <p:cNvSpPr>
+            <a:spLocks noGrp="1"/>
+          </p:cNvSpPr>
+          <p:nvPr>
+            <p:ph type="body" idx="1"/>
+          </p:nvPr>
+        </p:nvSpPr>
+        <p:spPr/>
+        <p:txBody>
+          <a:bodyPr/>
+          <a:lstStyle/>
+          <a:p>
+            <a:r>
+              <a:rPr lang="es-ES" dirty="0"/>
+              <a:t>Se han implementado 12 algoritmos de comparación de cadenas, y probados todos ellos con cadenas sintéticas generadas aleatoriamente (10.000 cadenas), que sufren las siguientes variaciones:</a:t>
+            </a:r>
+          </a:p>
+          <a:p>
+            <a:pPr marL="171450" marR="0" lvl="0" indent="-171450" algn="l" defTabSz="914400" rtl="0" eaLnBrk="1" fontAlgn="auto" latinLnBrk="0" hangingPunct="1">
+              <a:lnSpc>
+                <a:spcPct val="100000"/>
+              </a:lnSpc>
+              <a:spcBef>
+                <a:spcPts val="0"/>
+              </a:spcBef>
+              <a:spcAft>
+                <a:spcPts val="0"/>
+              </a:spcAft>
+              <a:buClrTx/>
+              <a:buSzTx/>
+              <a:buFontTx/>
+              <a:buChar char="-"/>
+              <a:tabLst/>
+              <a:defRPr/>
+            </a:pPr>
+            <a:r>
+              <a:rPr lang="es-ES" dirty="0"/>
+              <a:t>Iguales: La cadena no sufre ninguna variación, y por lo tanto </a:t>
+            </a:r>
+            <a:r>
+              <a:rPr lang="es-ES" dirty="0" err="1"/>
+              <a:t>evalua</a:t>
+            </a:r>
+            <a:r>
+              <a:rPr lang="es-ES" dirty="0"/>
+              <a:t> la capacidad de el algoritmo de detectar cadenas iguales. En este caso nos interesa un valor de similitud cercano a 1.</a:t>
+            </a:r>
+          </a:p>
+          <a:p>
+            <a:pPr marL="171450" marR="0" lvl="0" indent="-171450" algn="l" defTabSz="914400" rtl="0" eaLnBrk="1" fontAlgn="auto" latinLnBrk="0" hangingPunct="1">
+              <a:lnSpc>
+                <a:spcPct val="100000"/>
+              </a:lnSpc>
+              <a:spcBef>
+                <a:spcPts val="0"/>
+              </a:spcBef>
+              <a:spcAft>
+                <a:spcPts val="0"/>
+              </a:spcAft>
+              <a:buClrTx/>
+              <a:buSzTx/>
+              <a:buFontTx/>
+              <a:buChar char="-"/>
+              <a:tabLst/>
+              <a:defRPr/>
+            </a:pPr>
+            <a:r>
+              <a:rPr lang="es-ES" dirty="0"/>
+              <a:t>Distintas: Las cadenas son generadas aleatoriamente sin ningún rasgo en común a priori. En este caso nos interesa un valor de similitud cercano a 0.</a:t>
+            </a:r>
+          </a:p>
+          <a:p>
+            <a:pPr marL="171450" marR="0" lvl="0" indent="-171450" algn="l" defTabSz="914400" rtl="0" eaLnBrk="1" fontAlgn="auto" latinLnBrk="0" hangingPunct="1">
+              <a:lnSpc>
+                <a:spcPct val="100000"/>
+              </a:lnSpc>
+              <a:spcBef>
+                <a:spcPts val="0"/>
+              </a:spcBef>
+              <a:spcAft>
+                <a:spcPts val="0"/>
+              </a:spcAft>
+              <a:buClrTx/>
+              <a:buSzTx/>
+              <a:buFontTx/>
+              <a:buChar char="-"/>
+              <a:tabLst/>
+              <a:defRPr/>
+            </a:pPr>
+            <a:r>
+              <a:rPr lang="es-ES" dirty="0"/>
+              <a:t>Variaciones en cadenas (nos interesa un valor de similitud lo mas alto posible, sin llegar a 1):</a:t>
+            </a:r>
+          </a:p>
+          <a:p>
+            <a:pPr marL="628650" lvl="1" indent="-171450">
+              <a:buFontTx/>
+              <a:buChar char="-"/>
+            </a:pPr>
+            <a:r>
+              <a:rPr lang="es-ES" dirty="0"/>
+              <a:t>Desordenada: Los tokens de la cadena han sido desordenados de forma aleatoria, desde 1 desordenación hasta n, siendo n el numero de tokens</a:t>
+            </a:r>
+          </a:p>
+          <a:p>
+            <a:pPr marL="628650" lvl="1" indent="-171450">
+              <a:buFontTx/>
+              <a:buChar char="-"/>
+            </a:pPr>
+            <a:r>
+              <a:rPr lang="es-ES" dirty="0"/>
+              <a:t>Cambios de caracteres: Se han cambiado caracteres aleatoriamente en uno o todos los tokens, desde 1 cambio hasta n/2, siendo n el numero de </a:t>
+            </a:r>
+            <a:r>
+              <a:rPr lang="es-ES" dirty="0" err="1"/>
+              <a:t>caranteres</a:t>
+            </a:r>
+            <a:r>
+              <a:rPr lang="es-ES" dirty="0"/>
+              <a:t>.</a:t>
+            </a:r>
+          </a:p>
+          <a:p>
+            <a:pPr marL="628650" lvl="1" indent="-171450">
+              <a:buFontTx/>
+              <a:buChar char="-"/>
+            </a:pPr>
+            <a:r>
+              <a:rPr lang="es-ES" dirty="0"/>
+              <a:t>Trucado: Se eliminan m caracteres aleatoriamente en uno o todos los tokens de la parte final de los tokens, estando n comprendido entre 2 y n-1, siendo n el numero de caracteres total del token.</a:t>
+            </a:r>
+          </a:p>
+          <a:p>
+            <a:pPr marL="628650" lvl="1" indent="-171450">
+              <a:buFontTx/>
+              <a:buChar char="-"/>
+            </a:pPr>
+            <a:r>
+              <a:rPr lang="es-ES" dirty="0"/>
+              <a:t>Todos: Se realizan todos los cambios en las cadenas, descritos anteriormente</a:t>
+            </a:r>
+          </a:p>
+          <a:p>
+            <a:pPr marL="0" lvl="0" indent="0">
+              <a:buFontTx/>
+              <a:buNone/>
+            </a:pPr>
+            <a:endParaRPr lang="es-ES" dirty="0"/>
+          </a:p>
+          <a:p>
+            <a:pPr marL="0" lvl="0" indent="0">
+              <a:buFontTx/>
+              <a:buNone/>
+            </a:pPr>
+            <a:r>
+              <a:rPr lang="es-ES" dirty="0"/>
+              <a:t>Se pueden ver en la tabla, algoritmos extremadamente optimistas (en rojo), como el  de Jaro Winkler, que incluso tiende a encontrar algún grado de similitud entre cadenas distintas, o más pesimistas (verde), como el de Jaccard, que arrojan valores de similitud muy bajos, con cualquier tipo de alteración en las cadenas. </a:t>
+            </a:r>
+          </a:p>
+        </p:txBody>
+      </p:sp>
+      <p:sp>
+        <p:nvSpPr>
+          <p:cNvPr id="4" name="Marcador de número de diapositiva 3"/>
+          <p:cNvSpPr>
+            <a:spLocks noGrp="1"/>
+          </p:cNvSpPr>
+          <p:nvPr>
+            <p:ph type="sldNum" sz="quarter" idx="5"/>
+          </p:nvPr>
+        </p:nvSpPr>
+        <p:spPr/>
+        <p:txBody>
+          <a:bodyPr/>
+          <a:lstStyle/>
+          <a:p>
+            <a:fld id="{EBE0464F-B7A6-41EA-9FCA-FF947132E9B8}" type="slidenum">
+              <a:rPr lang="es-ES" smtClean="0"/>
+              <a:t>8</a:t>
+            </a:fld>
+            <a:endParaRPr lang="es-ES"/>
+          </a:p>
+        </p:txBody>
+      </p:sp>
+    </p:spTree>
+    <p:extLst>
+      <p:ext uri="{BB962C8B-B14F-4D97-AF65-F5344CB8AC3E}">
+        <p14:creationId xmlns:p14="http://schemas.microsoft.com/office/powerpoint/2010/main" val="90430037"/>
+      </p:ext>
+    </p:extLst>
+  </p:cSld>
+  <p:clrMapOvr>
+    <a:masterClrMapping/>
+  </p:clrMapOvr>
+</p:notes>
+</file>
+
+<file path=ppt/notesSlides/notesSlide7.xml><?xml version="1.0" encoding="utf-8"?>
+<p:notes xmlns:a="http://schemas.openxmlformats.org/drawingml/2006/main" xmlns:r="http://schemas.openxmlformats.org/officeDocument/2006/relationships" xmlns:p="http://schemas.openxmlformats.org/presentationml/2006/main">
+  <p:cSld>
+    <p:spTree>
+      <p:nvGrpSpPr>
+        <p:cNvPr id="1" name=""/>
+        <p:cNvGrpSpPr/>
+        <p:nvPr/>
+      </p:nvGrpSpPr>
+      <p:grpSpPr>
+        <a:xfrm>
+          <a:off x="0" y="0"/>
+          <a:ext cx="0" cy="0"/>
+          <a:chOff x="0" y="0"/>
+          <a:chExt cx="0" cy="0"/>
+        </a:xfrm>
+      </p:grpSpPr>
+      <p:sp>
+        <p:nvSpPr>
+          <p:cNvPr id="2" name="Marcador de imagen de diapositiva 1"/>
+          <p:cNvSpPr>
+            <a:spLocks noGrp="1" noRot="1" noChangeAspect="1"/>
+          </p:cNvSpPr>
+          <p:nvPr>
+            <p:ph type="sldImg"/>
+          </p:nvPr>
+        </p:nvSpPr>
+        <p:spPr/>
+      </p:sp>
+      <p:sp>
+        <p:nvSpPr>
+          <p:cNvPr id="3" name="Marcador de notas 2"/>
+          <p:cNvSpPr>
+            <a:spLocks noGrp="1"/>
+          </p:cNvSpPr>
+          <p:nvPr>
+            <p:ph type="body" idx="1"/>
+          </p:nvPr>
+        </p:nvSpPr>
+        <p:spPr/>
+        <p:txBody>
+          <a:bodyPr/>
+          <a:lstStyle/>
+          <a:p>
+            <a:r>
+              <a:rPr lang="es-ES" dirty="0"/>
+              <a:t>Conclusión: Ningún algoritmo por si mismo funciona adecuadamente en todos los casos</a:t>
+            </a:r>
+          </a:p>
+          <a:p>
+            <a:r>
+              <a:rPr lang="es-ES" dirty="0"/>
+              <a:t>Idea: En base a todos los algoritmos implementar un algoritmo de consenso, que maximice los valores altos cuando se forma mayoritaria se infiera un alto grado de similitud, y maximizar los bajos en caso contrario</a:t>
+            </a:r>
+          </a:p>
+          <a:p>
+            <a:endParaRPr lang="es-ES" dirty="0"/>
+          </a:p>
+          <a:p>
+            <a:endParaRPr lang="es-ES" dirty="0"/>
+          </a:p>
+        </p:txBody>
+      </p:sp>
+      <p:sp>
+        <p:nvSpPr>
+          <p:cNvPr id="4" name="Marcador de número de diapositiva 3"/>
+          <p:cNvSpPr>
+            <a:spLocks noGrp="1"/>
+          </p:cNvSpPr>
+          <p:nvPr>
+            <p:ph type="sldNum" sz="quarter" idx="5"/>
+          </p:nvPr>
+        </p:nvSpPr>
+        <p:spPr/>
+        <p:txBody>
+          <a:bodyPr/>
+          <a:lstStyle/>
+          <a:p>
+            <a:fld id="{EBE0464F-B7A6-41EA-9FCA-FF947132E9B8}" type="slidenum">
+              <a:rPr lang="es-ES" smtClean="0"/>
+              <a:t>9</a:t>
+            </a:fld>
+            <a:endParaRPr lang="es-ES"/>
+          </a:p>
+        </p:txBody>
+      </p:sp>
+    </p:spTree>
+    <p:extLst>
+      <p:ext uri="{BB962C8B-B14F-4D97-AF65-F5344CB8AC3E}">
+        <p14:creationId xmlns:p14="http://schemas.microsoft.com/office/powerpoint/2010/main" val="3301276093"/>
+      </p:ext>
+    </p:extLst>
+  </p:cSld>
+  <p:clrMapOvr>
+    <a:masterClrMapping/>
+  </p:clrMapOvr>
+</p:notes>
+</file>
+
+<file path=ppt/notesSlides/notesSlide8.xml><?xml version="1.0" encoding="utf-8"?>
+<p:notes xmlns:a="http://schemas.openxmlformats.org/drawingml/2006/main" xmlns:r="http://schemas.openxmlformats.org/officeDocument/2006/relationships" xmlns:p="http://schemas.openxmlformats.org/presentationml/2006/main">
+  <p:cSld>
+    <p:spTree>
+      <p:nvGrpSpPr>
+        <p:cNvPr id="1" name=""/>
+        <p:cNvGrpSpPr/>
+        <p:nvPr/>
+      </p:nvGrpSpPr>
+      <p:grpSpPr>
+        <a:xfrm>
+          <a:off x="0" y="0"/>
+          <a:ext cx="0" cy="0"/>
+          <a:chOff x="0" y="0"/>
+          <a:chExt cx="0" cy="0"/>
+        </a:xfrm>
+      </p:grpSpPr>
+      <p:sp>
+        <p:nvSpPr>
+          <p:cNvPr id="2" name="Marcador de imagen de diapositiva 1"/>
+          <p:cNvSpPr>
+            <a:spLocks noGrp="1" noRot="1" noChangeAspect="1"/>
+          </p:cNvSpPr>
+          <p:nvPr>
+            <p:ph type="sldImg"/>
+          </p:nvPr>
+        </p:nvSpPr>
+        <p:spPr/>
+      </p:sp>
+      <p:sp>
+        <p:nvSpPr>
+          <p:cNvPr id="3" name="Marcador de notas 2"/>
+          <p:cNvSpPr>
+            <a:spLocks noGrp="1"/>
+          </p:cNvSpPr>
+          <p:nvPr>
+            <p:ph type="body" idx="1"/>
+          </p:nvPr>
+        </p:nvSpPr>
+        <p:spPr/>
+        <p:txBody>
+          <a:bodyPr/>
+          <a:lstStyle/>
+          <a:p>
+            <a:endParaRPr lang="es-ES" dirty="0"/>
+          </a:p>
+        </p:txBody>
+      </p:sp>
+      <p:sp>
+        <p:nvSpPr>
+          <p:cNvPr id="4" name="Marcador de número de diapositiva 3"/>
+          <p:cNvSpPr>
+            <a:spLocks noGrp="1"/>
+          </p:cNvSpPr>
+          <p:nvPr>
+            <p:ph type="sldNum" sz="quarter" idx="5"/>
+          </p:nvPr>
+        </p:nvSpPr>
+        <p:spPr/>
+        <p:txBody>
+          <a:bodyPr/>
+          <a:lstStyle/>
+          <a:p>
+            <a:fld id="{EBE0464F-B7A6-41EA-9FCA-FF947132E9B8}" type="slidenum">
+              <a:rPr lang="es-ES" smtClean="0"/>
+              <a:t>10</a:t>
+            </a:fld>
+            <a:endParaRPr lang="es-ES"/>
+          </a:p>
+        </p:txBody>
+      </p:sp>
+    </p:spTree>
+    <p:extLst>
+      <p:ext uri="{BB962C8B-B14F-4D97-AF65-F5344CB8AC3E}">
+        <p14:creationId xmlns:p14="http://schemas.microsoft.com/office/powerpoint/2010/main" val="1382904364"/>
+      </p:ext>
+    </p:extLst>
+  </p:cSld>
+  <p:clrMapOvr>
+    <a:masterClrMapping/>
+  </p:clrMapOvr>
+</p:notes>
+</file>
+
+<file path=ppt/notesSlides/notesSlide9.xml><?xml version="1.0" encoding="utf-8"?>
+<p:notes xmlns:a="http://schemas.openxmlformats.org/drawingml/2006/main" xmlns:r="http://schemas.openxmlformats.org/officeDocument/2006/relationships" xmlns:p="http://schemas.openxmlformats.org/presentationml/2006/main">
+  <p:cSld>
+    <p:spTree>
+      <p:nvGrpSpPr>
+        <p:cNvPr id="1" name=""/>
+        <p:cNvGrpSpPr/>
+        <p:nvPr/>
+      </p:nvGrpSpPr>
+      <p:grpSpPr>
+        <a:xfrm>
+          <a:off x="0" y="0"/>
+          <a:ext cx="0" cy="0"/>
+          <a:chOff x="0" y="0"/>
+          <a:chExt cx="0" cy="0"/>
+        </a:xfrm>
+      </p:grpSpPr>
+      <p:sp>
+        <p:nvSpPr>
+          <p:cNvPr id="2" name="Marcador de imagen de diapositiva 1"/>
+          <p:cNvSpPr>
+            <a:spLocks noGrp="1" noRot="1" noChangeAspect="1"/>
+          </p:cNvSpPr>
+          <p:nvPr>
+            <p:ph type="sldImg"/>
+          </p:nvPr>
+        </p:nvSpPr>
+        <p:spPr/>
+      </p:sp>
+      <p:sp>
+        <p:nvSpPr>
+          <p:cNvPr id="3" name="Marcador de notas 2"/>
+          <p:cNvSpPr>
+            <a:spLocks noGrp="1"/>
+          </p:cNvSpPr>
+          <p:nvPr>
+            <p:ph type="body" idx="1"/>
+          </p:nvPr>
+        </p:nvSpPr>
+        <p:spPr/>
+        <p:txBody>
+          <a:bodyPr/>
+          <a:lstStyle/>
+          <a:p>
+            <a:r>
+              <a:rPr lang="es-ES" dirty="0"/>
+              <a:t>La métrica de similitud de entidades, se calcula usando las similitudes antes descritas y ponderándolas según la capacidad del atributo de discriminación.</a:t>
+            </a:r>
+          </a:p>
+        </p:txBody>
+      </p:sp>
+      <p:sp>
+        <p:nvSpPr>
+          <p:cNvPr id="4" name="Marcador de número de diapositiva 3"/>
+          <p:cNvSpPr>
+            <a:spLocks noGrp="1"/>
+          </p:cNvSpPr>
+          <p:nvPr>
+            <p:ph type="sldNum" sz="quarter" idx="5"/>
+          </p:nvPr>
+        </p:nvSpPr>
+        <p:spPr/>
+        <p:txBody>
+          <a:bodyPr/>
+          <a:lstStyle/>
+          <a:p>
+            <a:fld id="{EBE0464F-B7A6-41EA-9FCA-FF947132E9B8}" type="slidenum">
+              <a:rPr lang="es-ES" smtClean="0"/>
+              <a:t>11</a:t>
+            </a:fld>
+            <a:endParaRPr lang="es-ES"/>
+          </a:p>
+        </p:txBody>
+      </p:sp>
+    </p:spTree>
+    <p:extLst>
+      <p:ext uri="{BB962C8B-B14F-4D97-AF65-F5344CB8AC3E}">
+        <p14:creationId xmlns:p14="http://schemas.microsoft.com/office/powerpoint/2010/main" val="1727209606"/>
+      </p:ext>
+    </p:extLst>
+  </p:cSld>
+  <p:clrMapOvr>
+    <a:masterClrMapping/>
+  </p:clrMapOvr>
+</p:notes>
+</file>
+
 <file path=ppt/slideLayouts/slideLayout1.xml><?xml version="1.0" encoding="utf-8"?>
 <p:sldLayout xmlns:a="http://schemas.openxmlformats.org/drawingml/2006/main" xmlns:r="http://schemas.openxmlformats.org/officeDocument/2006/relationships" xmlns:p="http://schemas.openxmlformats.org/presentationml/2006/main" preserve="1" userDrawn="1">
   <p:cSld name="Diapositiva de título">
@@ -1001,7 +2266,7 @@
           <a:p>
             <a:fld id="{0C6440F9-88A6-4EC7-9B1D-88603D4CA55F}" type="datetimeFigureOut">
               <a:rPr lang="es-ES" smtClean="0"/>
-              <a:t>22/09/2020</a:t>
+              <a:t>23/09/2020</a:t>
             </a:fld>
             <a:endParaRPr lang="es-ES"/>
           </a:p>
@@ -1239,7 +2504,7 @@
           <a:p>
             <a:fld id="{0C6440F9-88A6-4EC7-9B1D-88603D4CA55F}" type="datetimeFigureOut">
               <a:rPr lang="es-ES" smtClean="0"/>
-              <a:t>22/09/2020</a:t>
+              <a:t>23/09/2020</a:t>
             </a:fld>
             <a:endParaRPr lang="es-ES"/>
           </a:p>
@@ -1544,7 +2809,7 @@
           <a:p>
             <a:fld id="{0C6440F9-88A6-4EC7-9B1D-88603D4CA55F}" type="datetimeFigureOut">
               <a:rPr lang="es-ES" smtClean="0"/>
-              <a:t>22/09/2020</a:t>
+              <a:t>23/09/2020</a:t>
             </a:fld>
             <a:endParaRPr lang="es-ES"/>
           </a:p>
@@ -1847,7 +3112,7 @@
           <a:p>
             <a:fld id="{0C6440F9-88A6-4EC7-9B1D-88603D4CA55F}" type="datetimeFigureOut">
               <a:rPr lang="es-ES" smtClean="0"/>
-              <a:t>22/09/2020</a:t>
+              <a:t>23/09/2020</a:t>
             </a:fld>
             <a:endParaRPr lang="es-ES"/>
           </a:p>
@@ -2298,7 +3563,7 @@
           <a:p>
             <a:fld id="{0C6440F9-88A6-4EC7-9B1D-88603D4CA55F}" type="datetimeFigureOut">
               <a:rPr lang="es-ES" smtClean="0"/>
-              <a:t>22/09/2020</a:t>
+              <a:t>23/09/2020</a:t>
             </a:fld>
             <a:endParaRPr lang="es-ES"/>
           </a:p>
@@ -2471,7 +3736,7 @@
           <a:p>
             <a:fld id="{0C6440F9-88A6-4EC7-9B1D-88603D4CA55F}" type="datetimeFigureOut">
               <a:rPr lang="es-ES" smtClean="0"/>
-              <a:t>22/09/2020</a:t>
+              <a:t>23/09/2020</a:t>
             </a:fld>
             <a:endParaRPr lang="es-ES"/>
           </a:p>
@@ -2815,7 +4080,7 @@
           <a:p>
             <a:fld id="{0C6440F9-88A6-4EC7-9B1D-88603D4CA55F}" type="datetimeFigureOut">
               <a:rPr lang="es-ES" smtClean="0"/>
-              <a:t>22/09/2020</a:t>
+              <a:t>23/09/2020</a:t>
             </a:fld>
             <a:endParaRPr lang="es-ES"/>
           </a:p>
@@ -3136,7 +4401,7 @@
           <a:p>
             <a:fld id="{0C6440F9-88A6-4EC7-9B1D-88603D4CA55F}" type="datetimeFigureOut">
               <a:rPr lang="es-ES" smtClean="0"/>
-              <a:t>22/09/2020</a:t>
+              <a:t>23/09/2020</a:t>
             </a:fld>
             <a:endParaRPr lang="es-ES"/>
           </a:p>
@@ -3555,7 +4820,7 @@
           <a:p>
             <a:fld id="{0C6440F9-88A6-4EC7-9B1D-88603D4CA55F}" type="datetimeFigureOut">
               <a:rPr lang="es-ES" smtClean="0"/>
-              <a:t>22/09/2020</a:t>
+              <a:t>23/09/2020</a:t>
             </a:fld>
             <a:endParaRPr lang="es-ES"/>
           </a:p>
@@ -3793,7 +5058,7 @@
           <a:p>
             <a:fld id="{0C6440F9-88A6-4EC7-9B1D-88603D4CA55F}" type="datetimeFigureOut">
               <a:rPr lang="es-ES" smtClean="0"/>
-              <a:t>22/09/2020</a:t>
+              <a:t>23/09/2020</a:t>
             </a:fld>
             <a:endParaRPr lang="es-ES"/>
           </a:p>
@@ -4029,7 +5294,7 @@
           <a:p>
             <a:fld id="{4A5A45B6-2818-4683-9C60-0C1210601B5B}" type="datetimeFigureOut">
               <a:rPr lang="es-ES" smtClean="0"/>
-              <a:t>22/09/2020</a:t>
+              <a:t>23/09/2020</a:t>
             </a:fld>
             <a:endParaRPr lang="es-ES"/>
           </a:p>
@@ -4227,7 +5492,7 @@
           <a:p>
             <a:fld id="{4A5A45B6-2818-4683-9C60-0C1210601B5B}" type="datetimeFigureOut">
               <a:rPr lang="es-ES" smtClean="0"/>
-              <a:t>22/09/2020</a:t>
+              <a:t>23/09/2020</a:t>
             </a:fld>
             <a:endParaRPr lang="es-ES"/>
           </a:p>
@@ -4502,7 +5767,7 @@
           <a:p>
             <a:fld id="{4A5A45B6-2818-4683-9C60-0C1210601B5B}" type="datetimeFigureOut">
               <a:rPr lang="es-ES" smtClean="0"/>
-              <a:t>22/09/2020</a:t>
+              <a:t>23/09/2020</a:t>
             </a:fld>
             <a:endParaRPr lang="es-ES"/>
           </a:p>
@@ -4767,7 +6032,7 @@
           <a:p>
             <a:fld id="{4A5A45B6-2818-4683-9C60-0C1210601B5B}" type="datetimeFigureOut">
               <a:rPr lang="es-ES" smtClean="0"/>
-              <a:t>22/09/2020</a:t>
+              <a:t>23/09/2020</a:t>
             </a:fld>
             <a:endParaRPr lang="es-ES"/>
           </a:p>
@@ -5179,7 +6444,7 @@
           <a:p>
             <a:fld id="{4A5A45B6-2818-4683-9C60-0C1210601B5B}" type="datetimeFigureOut">
               <a:rPr lang="es-ES" smtClean="0"/>
-              <a:t>22/09/2020</a:t>
+              <a:t>23/09/2020</a:t>
             </a:fld>
             <a:endParaRPr lang="es-ES"/>
           </a:p>
@@ -5320,7 +6585,7 @@
           <a:p>
             <a:fld id="{4A5A45B6-2818-4683-9C60-0C1210601B5B}" type="datetimeFigureOut">
               <a:rPr lang="es-ES" smtClean="0"/>
-              <a:t>22/09/2020</a:t>
+              <a:t>23/09/2020</a:t>
             </a:fld>
             <a:endParaRPr lang="es-ES"/>
           </a:p>
@@ -5433,7 +6698,7 @@
           <a:p>
             <a:fld id="{4A5A45B6-2818-4683-9C60-0C1210601B5B}" type="datetimeFigureOut">
               <a:rPr lang="es-ES" smtClean="0"/>
-              <a:t>22/09/2020</a:t>
+              <a:t>23/09/2020</a:t>
             </a:fld>
             <a:endParaRPr lang="es-ES"/>
           </a:p>
@@ -5744,7 +7009,7 @@
           <a:p>
             <a:fld id="{4A5A45B6-2818-4683-9C60-0C1210601B5B}" type="datetimeFigureOut">
               <a:rPr lang="es-ES" smtClean="0"/>
-              <a:t>22/09/2020</a:t>
+              <a:t>23/09/2020</a:t>
             </a:fld>
             <a:endParaRPr lang="es-ES"/>
           </a:p>
@@ -6233,7 +7498,7 @@
           <a:p>
             <a:fld id="{4A5A45B6-2818-4683-9C60-0C1210601B5B}" type="datetimeFigureOut">
               <a:rPr lang="es-ES" smtClean="0"/>
-              <a:t>22/09/2020</a:t>
+              <a:t>23/09/2020</a:t>
             </a:fld>
             <a:endParaRPr lang="es-ES"/>
           </a:p>
@@ -6431,7 +7696,7 @@
           <a:p>
             <a:fld id="{4A5A45B6-2818-4683-9C60-0C1210601B5B}" type="datetimeFigureOut">
               <a:rPr lang="es-ES" smtClean="0"/>
-              <a:t>22/09/2020</a:t>
+              <a:t>23/09/2020</a:t>
             </a:fld>
             <a:endParaRPr lang="es-ES"/>
           </a:p>
@@ -6639,7 +7904,7 @@
           <a:p>
             <a:fld id="{4A5A45B6-2818-4683-9C60-0C1210601B5B}" type="datetimeFigureOut">
               <a:rPr lang="es-ES" smtClean="0"/>
-              <a:t>22/09/2020</a:t>
+              <a:t>23/09/2020</a:t>
             </a:fld>
             <a:endParaRPr lang="es-ES"/>
           </a:p>
@@ -6859,7 +8124,7 @@
           <a:p>
             <a:fld id="{954496B1-3386-49B8-A8CB-026D317131EE}" type="datetimeFigureOut">
               <a:rPr lang="es-ES" smtClean="0"/>
-              <a:t>22/09/2020</a:t>
+              <a:t>23/09/2020</a:t>
             </a:fld>
             <a:endParaRPr lang="es-ES"/>
           </a:p>
@@ -7057,7 +8322,7 @@
           <a:p>
             <a:fld id="{954496B1-3386-49B8-A8CB-026D317131EE}" type="datetimeFigureOut">
               <a:rPr lang="es-ES" smtClean="0"/>
-              <a:t>22/09/2020</a:t>
+              <a:t>23/09/2020</a:t>
             </a:fld>
             <a:endParaRPr lang="es-ES"/>
           </a:p>
@@ -7332,7 +8597,7 @@
           <a:p>
             <a:fld id="{954496B1-3386-49B8-A8CB-026D317131EE}" type="datetimeFigureOut">
               <a:rPr lang="es-ES" smtClean="0"/>
-              <a:t>22/09/2020</a:t>
+              <a:t>23/09/2020</a:t>
             </a:fld>
             <a:endParaRPr lang="es-ES"/>
           </a:p>
@@ -7597,7 +8862,7 @@
           <a:p>
             <a:fld id="{954496B1-3386-49B8-A8CB-026D317131EE}" type="datetimeFigureOut">
               <a:rPr lang="es-ES" smtClean="0"/>
-              <a:t>22/09/2020</a:t>
+              <a:t>23/09/2020</a:t>
             </a:fld>
             <a:endParaRPr lang="es-ES"/>
           </a:p>
@@ -8009,7 +9274,7 @@
           <a:p>
             <a:fld id="{954496B1-3386-49B8-A8CB-026D317131EE}" type="datetimeFigureOut">
               <a:rPr lang="es-ES" smtClean="0"/>
-              <a:t>22/09/2020</a:t>
+              <a:t>23/09/2020</a:t>
             </a:fld>
             <a:endParaRPr lang="es-ES"/>
           </a:p>
@@ -8150,7 +9415,7 @@
           <a:p>
             <a:fld id="{954496B1-3386-49B8-A8CB-026D317131EE}" type="datetimeFigureOut">
               <a:rPr lang="es-ES" smtClean="0"/>
-              <a:t>22/09/2020</a:t>
+              <a:t>23/09/2020</a:t>
             </a:fld>
             <a:endParaRPr lang="es-ES"/>
           </a:p>
@@ -8263,7 +9528,7 @@
           <a:p>
             <a:fld id="{954496B1-3386-49B8-A8CB-026D317131EE}" type="datetimeFigureOut">
               <a:rPr lang="es-ES" smtClean="0"/>
-              <a:t>22/09/2020</a:t>
+              <a:t>23/09/2020</a:t>
             </a:fld>
             <a:endParaRPr lang="es-ES"/>
           </a:p>
@@ -8837,7 +10102,7 @@
           <a:p>
             <a:fld id="{954496B1-3386-49B8-A8CB-026D317131EE}" type="datetimeFigureOut">
               <a:rPr lang="es-ES" smtClean="0"/>
-              <a:t>22/09/2020</a:t>
+              <a:t>23/09/2020</a:t>
             </a:fld>
             <a:endParaRPr lang="es-ES"/>
           </a:p>
@@ -9125,7 +10390,7 @@
           <a:p>
             <a:fld id="{954496B1-3386-49B8-A8CB-026D317131EE}" type="datetimeFigureOut">
               <a:rPr lang="es-ES" smtClean="0"/>
-              <a:t>22/09/2020</a:t>
+              <a:t>23/09/2020</a:t>
             </a:fld>
             <a:endParaRPr lang="es-ES"/>
           </a:p>
@@ -9323,7 +10588,7 @@
           <a:p>
             <a:fld id="{954496B1-3386-49B8-A8CB-026D317131EE}" type="datetimeFigureOut">
               <a:rPr lang="es-ES" smtClean="0"/>
-              <a:t>22/09/2020</a:t>
+              <a:t>23/09/2020</a:t>
             </a:fld>
             <a:endParaRPr lang="es-ES"/>
           </a:p>
@@ -9531,7 +10796,7 @@
           <a:p>
             <a:fld id="{954496B1-3386-49B8-A8CB-026D317131EE}" type="datetimeFigureOut">
               <a:rPr lang="es-ES" smtClean="0"/>
-              <a:t>22/09/2020</a:t>
+              <a:t>23/09/2020</a:t>
             </a:fld>
             <a:endParaRPr lang="es-ES"/>
           </a:p>
@@ -12243,7 +13508,7 @@
           <a:p>
             <a:fld id="{4A5A45B6-2818-4683-9C60-0C1210601B5B}" type="datetimeFigureOut">
               <a:rPr lang="es-ES" smtClean="0"/>
-              <a:t>22/09/2020</a:t>
+              <a:t>23/09/2020</a:t>
             </a:fld>
             <a:endParaRPr lang="es-ES"/>
           </a:p>
@@ -12811,7 +14076,7 @@
           <a:p>
             <a:fld id="{954496B1-3386-49B8-A8CB-026D317131EE}" type="datetimeFigureOut">
               <a:rPr lang="es-ES" smtClean="0"/>
-              <a:t>22/09/2020</a:t>
+              <a:t>23/09/2020</a:t>
             </a:fld>
             <a:endParaRPr lang="es-ES"/>
           </a:p>
@@ -13925,7 +15190,7 @@
             </a:pPr>
             <a:r>
               <a:rPr lang="es-ES" sz="1400" dirty="0"/>
-              <a:t>Se calcula como según la similitud ponderada de los atributos de forma que se otorgue mayor peso a los atributos mas determinante, y menos al resto </a:t>
+              <a:t>Se calcula como según la similitud ponderada de los atributos de forma que se otorgue mayor peso a los atributos mas determinantes, y menos al resto </a:t>
             </a:r>
           </a:p>
         </p:txBody>
@@ -14174,7 +15439,7 @@
                 <a:avLst/>
               </a:prstGeom>
               <a:blipFill>
-                <a:blip r:embed="rId2"/>
+                <a:blip r:embed="rId3"/>
                 <a:stretch>
                   <a:fillRect l="-852" t="-2817"/>
                 </a:stretch>
@@ -14210,7 +15475,7 @@
           <p:nvPr/>
         </p:nvPicPr>
         <p:blipFill>
-          <a:blip r:embed="rId3"/>
+          <a:blip r:embed="rId4"/>
           <a:stretch>
             <a:fillRect/>
           </a:stretch>
@@ -14239,415 +15504,6 @@
 </file>
 
 <file path=ppt/slides/slide12.xml><?xml version="1.0" encoding="utf-8"?>
-<p:sld xmlns:a="http://schemas.openxmlformats.org/drawingml/2006/main" xmlns:r="http://schemas.openxmlformats.org/officeDocument/2006/relationships" xmlns:p="http://schemas.openxmlformats.org/presentationml/2006/main">
-  <p:cSld>
-    <p:spTree>
-      <p:nvGrpSpPr>
-        <p:cNvPr id="1" name=""/>
-        <p:cNvGrpSpPr/>
-        <p:nvPr/>
-      </p:nvGrpSpPr>
-      <p:grpSpPr>
-        <a:xfrm>
-          <a:off x="0" y="0"/>
-          <a:ext cx="0" cy="0"/>
-          <a:chOff x="0" y="0"/>
-          <a:chExt cx="0" cy="0"/>
-        </a:xfrm>
-      </p:grpSpPr>
-      <p:sp>
-        <p:nvSpPr>
-          <p:cNvPr id="2" name="CuadroTexto 1">
-            <a:extLst>
-              <a:ext uri="{FF2B5EF4-FFF2-40B4-BE49-F238E27FC236}">
-                <a16:creationId xmlns:a16="http://schemas.microsoft.com/office/drawing/2014/main" id="{372817FE-30FA-4881-97F7-087E97EC70DF}"/>
-              </a:ext>
-            </a:extLst>
-          </p:cNvPr>
-          <p:cNvSpPr txBox="1"/>
-          <p:nvPr/>
-        </p:nvSpPr>
-        <p:spPr>
-          <a:xfrm>
-            <a:off x="216794" y="1392654"/>
-            <a:ext cx="11758411" cy="707886"/>
-          </a:xfrm>
-          <a:prstGeom prst="rect">
-            <a:avLst/>
-          </a:prstGeom>
-          <a:noFill/>
-        </p:spPr>
-        <p:txBody>
-          <a:bodyPr wrap="square" rtlCol="0">
-            <a:spAutoFit/>
-          </a:bodyPr>
-          <a:lstStyle/>
-          <a:p>
-            <a:r>
-              <a:rPr lang="es-ES" sz="4000" dirty="0"/>
-              <a:t>Métricas de similitud (Entidades)</a:t>
-            </a:r>
-          </a:p>
-        </p:txBody>
-      </p:sp>
-      <p:sp>
-        <p:nvSpPr>
-          <p:cNvPr id="3" name="CuadroTexto 2">
-            <a:extLst>
-              <a:ext uri="{FF2B5EF4-FFF2-40B4-BE49-F238E27FC236}">
-                <a16:creationId xmlns:a16="http://schemas.microsoft.com/office/drawing/2014/main" id="{5AC02955-B68A-4468-B218-F80C970EBE53}"/>
-              </a:ext>
-            </a:extLst>
-          </p:cNvPr>
-          <p:cNvSpPr txBox="1"/>
-          <p:nvPr/>
-        </p:nvSpPr>
-        <p:spPr>
-          <a:xfrm>
-            <a:off x="216794" y="2193846"/>
-            <a:ext cx="11457992" cy="523220"/>
-          </a:xfrm>
-          <a:prstGeom prst="rect">
-            <a:avLst/>
-          </a:prstGeom>
-          <a:noFill/>
-        </p:spPr>
-        <p:txBody>
-          <a:bodyPr wrap="square" rtlCol="0">
-            <a:spAutoFit/>
-          </a:bodyPr>
-          <a:lstStyle/>
-          <a:p>
-            <a:pPr marL="171450" indent="-171450">
-              <a:buFont typeface="Arial" panose="020B0604020202020204" pitchFamily="34" charset="0"/>
-              <a:buChar char="•"/>
-            </a:pPr>
-            <a:r>
-              <a:rPr lang="es-ES" sz="1400" dirty="0"/>
-              <a:t>Todas las métricas han de estar normalizadas (valores entre [0,1])</a:t>
-            </a:r>
-          </a:p>
-          <a:p>
-            <a:pPr marL="171450" indent="-171450">
-              <a:buFont typeface="Arial" panose="020B0604020202020204" pitchFamily="34" charset="0"/>
-              <a:buChar char="•"/>
-            </a:pPr>
-            <a:r>
-              <a:rPr lang="es-ES" sz="1400" dirty="0"/>
-              <a:t>Se calcula como según la similitud ponderada de los atributos de forma que se otorgue mayor peso a los atributos mas determinante, y menos al resto </a:t>
-            </a:r>
-          </a:p>
-        </p:txBody>
-      </p:sp>
-      <p:sp>
-        <p:nvSpPr>
-          <p:cNvPr id="4" name="CuadroTexto 3">
-            <a:extLst>
-              <a:ext uri="{FF2B5EF4-FFF2-40B4-BE49-F238E27FC236}">
-                <a16:creationId xmlns:a16="http://schemas.microsoft.com/office/drawing/2014/main" id="{6EE69076-0350-4900-A17B-7F0CA6FA1D16}"/>
-              </a:ext>
-            </a:extLst>
-          </p:cNvPr>
-          <p:cNvSpPr txBox="1"/>
-          <p:nvPr/>
-        </p:nvSpPr>
-        <p:spPr>
-          <a:xfrm>
-            <a:off x="216794" y="2810372"/>
-            <a:ext cx="11457992" cy="1015663"/>
-          </a:xfrm>
-          <a:prstGeom prst="rect">
-            <a:avLst/>
-          </a:prstGeom>
-          <a:noFill/>
-        </p:spPr>
-        <p:txBody>
-          <a:bodyPr wrap="square" rtlCol="0">
-            <a:spAutoFit/>
-          </a:bodyPr>
-          <a:lstStyle/>
-          <a:p>
-            <a:r>
-              <a:rPr lang="es-ES" sz="2400" i="1" dirty="0"/>
-              <a:t>Valoración de la capacidad de discriminación de un atributo:</a:t>
-            </a:r>
-          </a:p>
-          <a:p>
-            <a:endParaRPr lang="es-ES" sz="800" i="1" dirty="0"/>
-          </a:p>
-          <a:p>
-            <a:r>
-              <a:rPr lang="es-ES" b="1" i="1" dirty="0"/>
-              <a:t>	</a:t>
-            </a:r>
-            <a:r>
-              <a:rPr lang="es-ES" sz="1600" b="1" i="1" dirty="0"/>
-              <a:t>Ratio de discriminación(D) [0,1]= # Valores distintos / Total de instancias</a:t>
-            </a:r>
-          </a:p>
-          <a:p>
-            <a:endParaRPr lang="es-ES" sz="1000" dirty="0"/>
-          </a:p>
-        </p:txBody>
-      </p:sp>
-      <mc:AlternateContent xmlns:mc="http://schemas.openxmlformats.org/markup-compatibility/2006" xmlns:a14="http://schemas.microsoft.com/office/drawing/2010/main">
-        <mc:Choice Requires="a14">
-          <p:sp>
-            <p:nvSpPr>
-              <p:cNvPr id="5" name="CuadroTexto 4">
-                <a:extLst>
-                  <a:ext uri="{FF2B5EF4-FFF2-40B4-BE49-F238E27FC236}">
-                    <a16:creationId xmlns:a16="http://schemas.microsoft.com/office/drawing/2014/main" id="{2F2144CE-F72E-48BE-BB69-4F8108E5E1E5}"/>
-                  </a:ext>
-                </a:extLst>
-              </p:cNvPr>
-              <p:cNvSpPr txBox="1"/>
-              <p:nvPr/>
-            </p:nvSpPr>
-            <p:spPr>
-              <a:xfrm>
-                <a:off x="216794" y="3919341"/>
-                <a:ext cx="11457992" cy="1730217"/>
-              </a:xfrm>
-              <a:prstGeom prst="rect">
-                <a:avLst/>
-              </a:prstGeom>
-              <a:noFill/>
-            </p:spPr>
-            <p:txBody>
-              <a:bodyPr wrap="square" rtlCol="0">
-                <a:spAutoFit/>
-              </a:bodyPr>
-              <a:lstStyle/>
-              <a:p>
-                <a:r>
-                  <a:rPr lang="es-ES" sz="2400" i="1" dirty="0"/>
-                  <a:t>Función de similitud para una entidad</a:t>
-                </a:r>
-              </a:p>
-              <a:p>
-                <a:endParaRPr lang="es-ES" sz="2400" i="1" dirty="0"/>
-              </a:p>
-              <a:p>
-                <a:r>
-                  <a:rPr lang="es-ES" sz="1400" i="1" dirty="0"/>
-                  <a:t>Donde:</a:t>
-                </a:r>
-              </a:p>
-              <a:p>
-                <a:pPr marL="285750" indent="-285750">
-                  <a:buFont typeface="Arial" panose="020B0604020202020204" pitchFamily="34" charset="0"/>
-                  <a:buChar char="•"/>
-                </a:pPr>
-                <a:r>
-                  <a:rPr lang="es-ES" sz="1400" b="1" dirty="0"/>
-                  <a:t>S</a:t>
-                </a:r>
-                <a:r>
-                  <a:rPr lang="es-ES" sz="1400" dirty="0"/>
-                  <a:t> es el valor de similitud del atributo, calculado según su tipo, como se ha mencionado en los apartados anteriores.</a:t>
-                </a:r>
-                <a:endParaRPr lang="es-ES" sz="1400" b="1" dirty="0"/>
-              </a:p>
-              <a:p>
-                <a:pPr marL="171450" indent="-171450">
-                  <a:buFont typeface="Arial" panose="020B0604020202020204" pitchFamily="34" charset="0"/>
-                  <a:buChar char="•"/>
-                </a:pPr>
-                <a:r>
-                  <a:rPr lang="es-ES" sz="1400" b="1" i="1" dirty="0"/>
-                  <a:t>  V</a:t>
-                </a:r>
-                <a:r>
-                  <a:rPr lang="es-ES" sz="1400" i="1" dirty="0"/>
-                  <a:t> </a:t>
-                </a:r>
-                <a:r>
-                  <a:rPr lang="es-ES" sz="1400" dirty="0"/>
-                  <a:t>es el ratio de variabilidad del atributo en el rango [0,1 ], calculado como: </a:t>
-                </a:r>
-                <a:r>
-                  <a:rPr lang="es-ES" sz="1400" b="1" dirty="0"/>
-                  <a:t>S = </a:t>
-                </a:r>
-                <a14:m>
-                  <m:oMath xmlns:m="http://schemas.openxmlformats.org/officeDocument/2006/math">
-                    <m:f>
-                      <m:fPr>
-                        <m:ctrlPr>
-                          <a:rPr lang="es-ES" sz="1400" b="1" i="1">
-                            <a:latin typeface="Cambria Math" panose="02040503050406030204" pitchFamily="18" charset="0"/>
-                          </a:rPr>
-                        </m:ctrlPr>
-                      </m:fPr>
-                      <m:num>
-                        <m:r>
-                          <a:rPr lang="es-ES" sz="1400" b="1" i="1">
-                            <a:latin typeface="Cambria Math" panose="02040503050406030204" pitchFamily="18" charset="0"/>
-                          </a:rPr>
-                          <m:t>𝑵</m:t>
-                        </m:r>
-                        <m:r>
-                          <a:rPr lang="es-ES" sz="1400" b="1" i="1">
-                            <a:latin typeface="Cambria Math" panose="02040503050406030204" pitchFamily="18" charset="0"/>
-                          </a:rPr>
-                          <m:t>º </m:t>
-                        </m:r>
-                        <m:r>
-                          <a:rPr lang="es-ES" sz="1400" b="1" i="1">
-                            <a:latin typeface="Cambria Math" panose="02040503050406030204" pitchFamily="18" charset="0"/>
-                          </a:rPr>
-                          <m:t>𝒗𝒂𝒍𝒐𝒓𝒆𝒔</m:t>
-                        </m:r>
-                        <m:r>
-                          <a:rPr lang="es-ES" sz="1400" b="1" i="1">
-                            <a:latin typeface="Cambria Math" panose="02040503050406030204" pitchFamily="18" charset="0"/>
-                          </a:rPr>
-                          <m:t> </m:t>
-                        </m:r>
-                        <m:r>
-                          <a:rPr lang="es-ES" sz="1400" b="1" i="1">
-                            <a:latin typeface="Cambria Math" panose="02040503050406030204" pitchFamily="18" charset="0"/>
-                          </a:rPr>
-                          <m:t>𝒅𝒊𝒔𝒕𝒊𝒏𝒕𝒐</m:t>
-                        </m:r>
-                      </m:num>
-                      <m:den>
-                        <m:r>
-                          <a:rPr lang="es-ES" sz="1400" b="1" i="1">
-                            <a:latin typeface="Cambria Math" panose="02040503050406030204" pitchFamily="18" charset="0"/>
-                          </a:rPr>
-                          <m:t>𝑻𝒐𝒕𝒂𝒍</m:t>
-                        </m:r>
-                        <m:r>
-                          <a:rPr lang="es-ES" sz="1400" b="1" i="1">
-                            <a:latin typeface="Cambria Math" panose="02040503050406030204" pitchFamily="18" charset="0"/>
-                          </a:rPr>
-                          <m:t> </m:t>
-                        </m:r>
-                        <m:r>
-                          <a:rPr lang="es-ES" sz="1400" b="1" i="1">
-                            <a:latin typeface="Cambria Math" panose="02040503050406030204" pitchFamily="18" charset="0"/>
-                          </a:rPr>
-                          <m:t>𝒅𝒆</m:t>
-                        </m:r>
-                        <m:r>
-                          <a:rPr lang="es-ES" sz="1400" b="1" i="1">
-                            <a:latin typeface="Cambria Math" panose="02040503050406030204" pitchFamily="18" charset="0"/>
-                          </a:rPr>
-                          <m:t> </m:t>
-                        </m:r>
-                        <m:r>
-                          <a:rPr lang="es-ES" sz="1400" b="1" i="1">
-                            <a:latin typeface="Cambria Math" panose="02040503050406030204" pitchFamily="18" charset="0"/>
-                          </a:rPr>
-                          <m:t>𝒊𝒏𝒔𝒕𝒂𝒏𝒄𝒊𝒂𝒔</m:t>
-                        </m:r>
-                      </m:den>
-                    </m:f>
-                  </m:oMath>
-                </a14:m>
-                <a:r>
-                  <a:rPr lang="es-ES" sz="1400" b="1" dirty="0"/>
-                  <a:t> </a:t>
-                </a:r>
-                <a:endParaRPr lang="es-ES" sz="1400" dirty="0"/>
-              </a:p>
-              <a:p>
-                <a:endParaRPr lang="es-ES" sz="1000" dirty="0"/>
-              </a:p>
-            </p:txBody>
-          </p:sp>
-        </mc:Choice>
-        <mc:Fallback xmlns="">
-          <p:sp>
-            <p:nvSpPr>
-              <p:cNvPr id="5" name="CuadroTexto 4">
-                <a:extLst>
-                  <a:ext uri="{FF2B5EF4-FFF2-40B4-BE49-F238E27FC236}">
-                    <a16:creationId xmlns:a16="http://schemas.microsoft.com/office/drawing/2014/main" id="{2F2144CE-F72E-48BE-BB69-4F8108E5E1E5}"/>
-                  </a:ext>
-                </a:extLst>
-              </p:cNvPr>
-              <p:cNvSpPr txBox="1">
-                <a:spLocks noRot="1" noChangeAspect="1" noMove="1" noResize="1" noEditPoints="1" noAdjustHandles="1" noChangeArrowheads="1" noChangeShapeType="1" noTextEdit="1"/>
-              </p:cNvSpPr>
-              <p:nvPr/>
-            </p:nvSpPr>
-            <p:spPr>
-              <a:xfrm>
-                <a:off x="216794" y="3919341"/>
-                <a:ext cx="11457992" cy="1730217"/>
-              </a:xfrm>
-              <a:prstGeom prst="rect">
-                <a:avLst/>
-              </a:prstGeom>
-              <a:blipFill>
-                <a:blip r:embed="rId2"/>
-                <a:stretch>
-                  <a:fillRect l="-852" t="-2817"/>
-                </a:stretch>
-              </a:blipFill>
-            </p:spPr>
-            <p:txBody>
-              <a:bodyPr/>
-              <a:lstStyle/>
-              <a:p>
-                <a:r>
-                  <a:rPr lang="es-ES">
-                    <a:noFill/>
-                  </a:rPr>
-                  <a:t> </a:t>
-                </a:r>
-              </a:p>
-            </p:txBody>
-          </p:sp>
-        </mc:Fallback>
-      </mc:AlternateContent>
-      <p:pic>
-        <p:nvPicPr>
-          <p:cNvPr id="6" name="Imagen 5">
-            <a:extLst>
-              <a:ext uri="{FF2B5EF4-FFF2-40B4-BE49-F238E27FC236}">
-                <a16:creationId xmlns:a16="http://schemas.microsoft.com/office/drawing/2014/main" id="{762B7AE0-5E2B-4553-9427-6A2B69DA67FA}"/>
-              </a:ext>
-            </a:extLst>
-          </p:cNvPr>
-          <p:cNvPicPr>
-            <a:picLocks noChangeAspect="1"/>
-          </p:cNvPicPr>
-          <p:nvPr/>
-        </p:nvPicPr>
-        <p:blipFill>
-          <a:blip r:embed="rId3"/>
-          <a:stretch>
-            <a:fillRect/>
-          </a:stretch>
-        </p:blipFill>
-        <p:spPr>
-          <a:xfrm>
-            <a:off x="5945790" y="3826035"/>
-            <a:ext cx="3501360" cy="791882"/>
-          </a:xfrm>
-          <a:prstGeom prst="rect">
-            <a:avLst/>
-          </a:prstGeom>
-        </p:spPr>
-      </p:pic>
-    </p:spTree>
-    <p:extLst>
-      <p:ext uri="{BB962C8B-B14F-4D97-AF65-F5344CB8AC3E}">
-        <p14:creationId xmlns:p14="http://schemas.microsoft.com/office/powerpoint/2010/main" val="3484235394"/>
-      </p:ext>
-    </p:extLst>
-  </p:cSld>
-  <p:clrMapOvr>
-    <a:masterClrMapping/>
-  </p:clrMapOvr>
-</p:sld>
-</file>
-
-<file path=ppt/slides/slide13.xml><?xml version="1.0" encoding="utf-8"?>
 <p:sld xmlns:a="http://schemas.openxmlformats.org/drawingml/2006/main" xmlns:r="http://schemas.openxmlformats.org/officeDocument/2006/relationships" xmlns:p="http://schemas.openxmlformats.org/presentationml/2006/main">
   <p:cSld>
     <p:spTree>
@@ -15400,7 +16256,7 @@
 </p:sld>
 </file>
 
-<file path=ppt/slides/slide14.xml><?xml version="1.0" encoding="utf-8"?>
+<file path=ppt/slides/slide13.xml><?xml version="1.0" encoding="utf-8"?>
 <p:sld xmlns:a="http://schemas.openxmlformats.org/drawingml/2006/main" xmlns:r="http://schemas.openxmlformats.org/officeDocument/2006/relationships" xmlns:p="http://schemas.openxmlformats.org/presentationml/2006/main">
   <p:cSld>
     <p:spTree>
@@ -16243,7 +17099,7 @@
         <p:spPr>
           <a:xfrm>
             <a:off x="354563" y="3880252"/>
-            <a:ext cx="11115869" cy="2339102"/>
+            <a:ext cx="11115869" cy="2585323"/>
           </a:xfrm>
           <a:prstGeom prst="rect">
             <a:avLst/>
@@ -16320,6 +17176,21 @@
                 <a:cs typeface="Segoe UI Light" panose="020B0502040204020203" pitchFamily="34" charset="0"/>
               </a:rPr>
               <a:t>orienta la búsqueda de similitudes, al proceso de importación desde una fuente externa (fichero), no a búsqueda de similitudes dentro del propio grafo de conocimiento</a:t>
+            </a:r>
+          </a:p>
+          <a:p>
+            <a:pPr marL="285750" indent="-285750">
+              <a:buFont typeface="Arial" panose="020B0604020202020204" pitchFamily="34" charset="0"/>
+              <a:buChar char="•"/>
+            </a:pPr>
+            <a:r>
+              <a:rPr lang="es-ES" sz="1600" kern="0" dirty="0">
+                <a:solidFill>
+                  <a:sysClr val="windowText" lastClr="000000"/>
+                </a:solidFill>
+                <a:cs typeface="Segoe UI Light" panose="020B0502040204020203" pitchFamily="34" charset="0"/>
+              </a:rPr>
+              <a:t>La implementación ad hoc, permite ajustar algoritmos y logica a las características del proyecto.</a:t>
             </a:r>
             <a:endParaRPr lang="es-ES" sz="1600" dirty="0"/>
           </a:p>
@@ -17158,12 +18029,12 @@
                     <a:p>
                       <a:pPr algn="l" fontAlgn="ctr"/>
                       <a:r>
-                        <a:rPr lang="es-ES" sz="1100" u="none" strike="noStrike">
+                        <a:rPr lang="es-ES" sz="1100" u="none" strike="noStrike" dirty="0">
                           <a:effectLst/>
                         </a:rPr>
                         <a:t>Desordenada</a:t>
                       </a:r>
-                      <a:endParaRPr lang="es-ES" sz="1100" b="1" i="0" u="none" strike="noStrike">
+                      <a:endParaRPr lang="es-ES" sz="1100" b="1" i="0" u="none" strike="noStrike" dirty="0">
                         <a:solidFill>
                           <a:srgbClr val="FFFFFF"/>
                         </a:solidFill>
@@ -17326,12 +18197,12 @@
                     <a:p>
                       <a:pPr algn="l" fontAlgn="ctr"/>
                       <a:r>
-                        <a:rPr lang="es-ES" sz="1100" u="none" strike="noStrike">
+                        <a:rPr lang="es-ES" sz="1100" u="none" strike="noStrike" dirty="0">
                           <a:effectLst/>
                         </a:rPr>
                         <a:t>Excelente</a:t>
                       </a:r>
-                      <a:endParaRPr lang="es-ES" sz="1100" b="0" i="0" u="none" strike="noStrike">
+                      <a:endParaRPr lang="es-ES" sz="1100" b="0" i="0" u="none" strike="noStrike" dirty="0">
                         <a:solidFill>
                           <a:srgbClr val="000000"/>
                         </a:solidFill>
@@ -17494,12 +18365,12 @@
                     <a:p>
                       <a:pPr algn="l" fontAlgn="ctr"/>
                       <a:r>
-                        <a:rPr lang="es-ES" sz="1100" u="none" strike="noStrike">
+                        <a:rPr lang="es-ES" sz="1100" u="none" strike="noStrike" dirty="0">
                           <a:effectLst/>
                         </a:rPr>
                         <a:t>Excelente</a:t>
                       </a:r>
-                      <a:endParaRPr lang="es-ES" sz="1100" b="0" i="0" u="none" strike="noStrike">
+                      <a:endParaRPr lang="es-ES" sz="1100" b="0" i="0" u="none" strike="noStrike" dirty="0">
                         <a:solidFill>
                           <a:srgbClr val="000000"/>
                         </a:solidFill>
@@ -17586,12 +18457,12 @@
                     <a:p>
                       <a:pPr algn="l" fontAlgn="ctr"/>
                       <a:r>
-                        <a:rPr lang="es-ES" sz="1100" u="none" strike="noStrike">
+                        <a:rPr lang="es-ES" sz="1100" u="none" strike="noStrike" dirty="0">
                           <a:effectLst/>
                         </a:rPr>
                         <a:t>Excelente</a:t>
                       </a:r>
-                      <a:endParaRPr lang="es-ES" sz="1100" b="0" i="0" u="none" strike="noStrike">
+                      <a:endParaRPr lang="es-ES" sz="1100" b="0" i="0" u="none" strike="noStrike" dirty="0">
                         <a:solidFill>
                           <a:srgbClr val="000000"/>
                         </a:solidFill>
@@ -17662,12 +18533,12 @@
                     <a:p>
                       <a:pPr algn="l" fontAlgn="ctr"/>
                       <a:r>
-                        <a:rPr lang="es-ES" sz="1100" u="none" strike="noStrike">
+                        <a:rPr lang="es-ES" sz="1100" u="none" strike="noStrike" dirty="0">
                           <a:effectLst/>
                         </a:rPr>
                         <a:t>Excelente</a:t>
                       </a:r>
-                      <a:endParaRPr lang="es-ES" sz="1100" b="0" i="0" u="none" strike="noStrike">
+                      <a:endParaRPr lang="es-ES" sz="1100" b="0" i="0" u="none" strike="noStrike" dirty="0">
                         <a:solidFill>
                           <a:srgbClr val="000000"/>
                         </a:solidFill>
@@ -17754,12 +18625,12 @@
                     <a:p>
                       <a:pPr algn="l" fontAlgn="ctr"/>
                       <a:r>
-                        <a:rPr lang="es-ES" sz="1100" u="none" strike="noStrike">
+                        <a:rPr lang="es-ES" sz="1100" u="none" strike="noStrike" dirty="0">
                           <a:effectLst/>
                         </a:rPr>
                         <a:t>Excelente</a:t>
                       </a:r>
-                      <a:endParaRPr lang="es-ES" sz="1100" b="0" i="0" u="none" strike="noStrike">
+                      <a:endParaRPr lang="es-ES" sz="1100" b="0" i="0" u="none" strike="noStrike" dirty="0">
                         <a:solidFill>
                           <a:srgbClr val="000000"/>
                         </a:solidFill>
@@ -17922,12 +18793,12 @@
                     <a:p>
                       <a:pPr algn="l" fontAlgn="ctr"/>
                       <a:r>
-                        <a:rPr lang="es-ES" sz="1100" u="none" strike="noStrike">
+                        <a:rPr lang="es-ES" sz="1100" u="none" strike="noStrike" dirty="0">
                           <a:effectLst/>
                         </a:rPr>
                         <a:t>Medio</a:t>
                       </a:r>
-                      <a:endParaRPr lang="es-ES" sz="1100" b="0" i="0" u="none" strike="noStrike">
+                      <a:endParaRPr lang="es-ES" sz="1100" b="0" i="0" u="none" strike="noStrike" dirty="0">
                         <a:solidFill>
                           <a:srgbClr val="000000"/>
                         </a:solidFill>
@@ -17998,12 +18869,12 @@
                     <a:p>
                       <a:pPr algn="l" fontAlgn="ctr"/>
                       <a:r>
-                        <a:rPr lang="es-ES" sz="1100" u="none" strike="noStrike">
+                        <a:rPr lang="es-ES" sz="1100" u="none" strike="noStrike" dirty="0">
                           <a:effectLst/>
                         </a:rPr>
                         <a:t>Excelente</a:t>
                       </a:r>
-                      <a:endParaRPr lang="es-ES" sz="1100" b="0" i="0" u="none" strike="noStrike">
+                      <a:endParaRPr lang="es-ES" sz="1100" b="0" i="0" u="none" strike="noStrike" dirty="0">
                         <a:solidFill>
                           <a:srgbClr val="000000"/>
                         </a:solidFill>
@@ -18090,12 +18961,12 @@
                     <a:p>
                       <a:pPr algn="l" fontAlgn="ctr"/>
                       <a:r>
-                        <a:rPr lang="es-ES" sz="1100" u="none" strike="noStrike">
+                        <a:rPr lang="es-ES" sz="1100" u="none" strike="noStrike" dirty="0">
                           <a:effectLst/>
                         </a:rPr>
                         <a:t>Excelente</a:t>
                       </a:r>
-                      <a:endParaRPr lang="es-ES" sz="1100" b="0" i="0" u="none" strike="noStrike">
+                      <a:endParaRPr lang="es-ES" sz="1100" b="0" i="0" u="none" strike="noStrike" dirty="0">
                         <a:solidFill>
                           <a:srgbClr val="000000"/>
                         </a:solidFill>
@@ -18172,7 +19043,7 @@
                     <a:p>
                       <a:pPr algn="l" fontAlgn="ctr"/>
                       <a:r>
-                        <a:rPr lang="es-ES" sz="1100" u="none" strike="noStrike">
+                        <a:rPr lang="es-ES" sz="1100" u="none" strike="noStrike" dirty="0">
                           <a:effectLst/>
                           <a:highlight>
                             <a:srgbClr val="00FF00"/>
@@ -18180,7 +19051,7 @@
                         </a:rPr>
                         <a:t>Excelente</a:t>
                       </a:r>
-                      <a:endParaRPr lang="es-ES" sz="1100" b="0" i="0" u="none" strike="noStrike">
+                      <a:endParaRPr lang="es-ES" sz="1100" b="0" i="0" u="none" strike="noStrike" dirty="0">
                         <a:solidFill>
                           <a:srgbClr val="000000"/>
                         </a:solidFill>
@@ -18376,7 +19247,7 @@
                     <a:p>
                       <a:pPr algn="l" fontAlgn="ctr"/>
                       <a:r>
-                        <a:rPr lang="es-ES" sz="1100" u="none" strike="noStrike">
+                        <a:rPr lang="es-ES" sz="1100" u="none" strike="noStrike" dirty="0">
                           <a:effectLst/>
                           <a:highlight>
                             <a:srgbClr val="FF0000"/>
@@ -18384,7 +19255,7 @@
                         </a:rPr>
                         <a:t>Excelente</a:t>
                       </a:r>
-                      <a:endParaRPr lang="es-ES" sz="1100" b="0" i="0" u="none" strike="noStrike">
+                      <a:endParaRPr lang="es-ES" sz="1100" b="0" i="0" u="none" strike="noStrike" dirty="0">
                         <a:solidFill>
                           <a:srgbClr val="000000"/>
                         </a:solidFill>
@@ -18574,12 +19445,12 @@
                     <a:p>
                       <a:pPr algn="l" fontAlgn="ctr"/>
                       <a:r>
-                        <a:rPr lang="es-ES" sz="1100" u="none" strike="noStrike">
+                        <a:rPr lang="es-ES" sz="1100" u="none" strike="noStrike" dirty="0">
                           <a:effectLst/>
                         </a:rPr>
                         <a:t>Excelente</a:t>
                       </a:r>
-                      <a:endParaRPr lang="es-ES" sz="1100" b="0" i="0" u="none" strike="noStrike">
+                      <a:endParaRPr lang="es-ES" sz="1100" b="0" i="0" u="none" strike="noStrike" dirty="0">
                         <a:solidFill>
                           <a:srgbClr val="000000"/>
                         </a:solidFill>
@@ -18666,12 +19537,12 @@
                     <a:p>
                       <a:pPr algn="l" fontAlgn="ctr"/>
                       <a:r>
-                        <a:rPr lang="es-ES" sz="1100" u="none" strike="noStrike">
+                        <a:rPr lang="es-ES" sz="1100" u="none" strike="noStrike" dirty="0">
                           <a:effectLst/>
                         </a:rPr>
                         <a:t>Excelente</a:t>
                       </a:r>
-                      <a:endParaRPr lang="es-ES" sz="1100" b="0" i="0" u="none" strike="noStrike">
+                      <a:endParaRPr lang="es-ES" sz="1100" b="0" i="0" u="none" strike="noStrike" dirty="0">
                         <a:solidFill>
                           <a:srgbClr val="000000"/>
                         </a:solidFill>
@@ -18742,12 +19613,12 @@
                     <a:p>
                       <a:pPr algn="l" fontAlgn="ctr"/>
                       <a:r>
-                        <a:rPr lang="es-ES" sz="1100" u="none" strike="noStrike">
+                        <a:rPr lang="es-ES" sz="1100" u="none" strike="noStrike" dirty="0">
                           <a:effectLst/>
                         </a:rPr>
                         <a:t>Excelente</a:t>
                       </a:r>
-                      <a:endParaRPr lang="es-ES" sz="1100" b="0" i="0" u="none" strike="noStrike">
+                      <a:endParaRPr lang="es-ES" sz="1100" b="0" i="0" u="none" strike="noStrike" dirty="0">
                         <a:solidFill>
                           <a:srgbClr val="000000"/>
                         </a:solidFill>
@@ -18834,12 +19705,12 @@
                     <a:p>
                       <a:pPr algn="l" fontAlgn="ctr"/>
                       <a:r>
-                        <a:rPr lang="es-ES" sz="1100" u="none" strike="noStrike">
+                        <a:rPr lang="es-ES" sz="1100" u="none" strike="noStrike" dirty="0">
                           <a:effectLst/>
                         </a:rPr>
                         <a:t>Alto</a:t>
                       </a:r>
-                      <a:endParaRPr lang="es-ES" sz="1100" b="0" i="0" u="none" strike="noStrike">
+                      <a:endParaRPr lang="es-ES" sz="1100" b="0" i="0" u="none" strike="noStrike" dirty="0">
                         <a:solidFill>
                           <a:srgbClr val="000000"/>
                         </a:solidFill>
@@ -18910,12 +19781,12 @@
                     <a:p>
                       <a:pPr algn="l" fontAlgn="ctr"/>
                       <a:r>
-                        <a:rPr lang="es-ES" sz="1100" u="none" strike="noStrike">
+                        <a:rPr lang="es-ES" sz="1100" u="none" strike="noStrike" dirty="0">
                           <a:effectLst/>
                         </a:rPr>
                         <a:t>Excelente</a:t>
                       </a:r>
-                      <a:endParaRPr lang="es-ES" sz="1100" b="0" i="0" u="none" strike="noStrike">
+                      <a:endParaRPr lang="es-ES" sz="1100" b="0" i="0" u="none" strike="noStrike" dirty="0">
                         <a:solidFill>
                           <a:srgbClr val="000000"/>
                         </a:solidFill>
@@ -19002,12 +19873,12 @@
                     <a:p>
                       <a:pPr algn="l" fontAlgn="ctr"/>
                       <a:r>
-                        <a:rPr lang="es-ES" sz="1100" u="none" strike="noStrike">
+                        <a:rPr lang="es-ES" sz="1100" u="none" strike="noStrike" dirty="0">
                           <a:effectLst/>
                         </a:rPr>
                         <a:t>Excelente</a:t>
                       </a:r>
-                      <a:endParaRPr lang="es-ES" sz="1100" b="0" i="0" u="none" strike="noStrike">
+                      <a:endParaRPr lang="es-ES" sz="1100" b="0" i="0" u="none" strike="noStrike" dirty="0">
                         <a:solidFill>
                           <a:srgbClr val="000000"/>
                         </a:solidFill>
@@ -19078,12 +19949,12 @@
                     <a:p>
                       <a:pPr algn="l" fontAlgn="ctr"/>
                       <a:r>
-                        <a:rPr lang="es-ES" sz="1100" u="none" strike="noStrike">
+                        <a:rPr lang="es-ES" sz="1100" u="none" strike="noStrike" dirty="0">
                           <a:effectLst/>
                         </a:rPr>
                         <a:t>Excelente</a:t>
                       </a:r>
-                      <a:endParaRPr lang="es-ES" sz="1100" b="0" i="0" u="none" strike="noStrike">
+                      <a:endParaRPr lang="es-ES" sz="1100" b="0" i="0" u="none" strike="noStrike" dirty="0">
                         <a:solidFill>
                           <a:srgbClr val="000000"/>
                         </a:solidFill>
@@ -19101,12 +19972,12 @@
                     <a:p>
                       <a:pPr algn="l" fontAlgn="ctr"/>
                       <a:r>
-                        <a:rPr lang="es-ES" sz="1100" u="none" strike="noStrike">
+                        <a:rPr lang="es-ES" sz="1100" u="none" strike="noStrike" dirty="0">
                           <a:effectLst/>
                         </a:rPr>
                         <a:t>Mal</a:t>
                       </a:r>
-                      <a:endParaRPr lang="es-ES" sz="1100" b="0" i="0" u="none" strike="noStrike">
+                      <a:endParaRPr lang="es-ES" sz="1100" b="0" i="0" u="none" strike="noStrike" dirty="0">
                         <a:solidFill>
                           <a:srgbClr val="000000"/>
                         </a:solidFill>
@@ -19170,12 +20041,12 @@
                     <a:p>
                       <a:pPr algn="l" fontAlgn="ctr"/>
                       <a:r>
-                        <a:rPr lang="es-ES" sz="1100" u="none" strike="noStrike">
+                        <a:rPr lang="es-ES" sz="1100" u="none" strike="noStrike" dirty="0">
                           <a:effectLst/>
                         </a:rPr>
                         <a:t>Excelente</a:t>
                       </a:r>
-                      <a:endParaRPr lang="es-ES" sz="1100" b="0" i="0" u="none" strike="noStrike">
+                      <a:endParaRPr lang="es-ES" sz="1100" b="0" i="0" u="none" strike="noStrike" dirty="0">
                         <a:solidFill>
                           <a:srgbClr val="000000"/>
                         </a:solidFill>
@@ -19246,12 +20117,12 @@
                     <a:p>
                       <a:pPr algn="l" fontAlgn="ctr"/>
                       <a:r>
-                        <a:rPr lang="es-ES" sz="1100" u="none" strike="noStrike">
+                        <a:rPr lang="es-ES" sz="1100" u="none" strike="noStrike" dirty="0">
                           <a:effectLst/>
                         </a:rPr>
                         <a:t>Excelente</a:t>
                       </a:r>
-                      <a:endParaRPr lang="es-ES" sz="1100" b="0" i="0" u="none" strike="noStrike">
+                      <a:endParaRPr lang="es-ES" sz="1100" b="0" i="0" u="none" strike="noStrike" dirty="0">
                         <a:solidFill>
                           <a:srgbClr val="000000"/>
                         </a:solidFill>
@@ -19269,12 +20140,12 @@
                     <a:p>
                       <a:pPr algn="l" fontAlgn="ctr"/>
                       <a:r>
-                        <a:rPr lang="es-ES" sz="1100" u="none" strike="noStrike">
+                        <a:rPr lang="es-ES" sz="1100" u="none" strike="noStrike" dirty="0">
                           <a:effectLst/>
                         </a:rPr>
                         <a:t>Medio</a:t>
                       </a:r>
-                      <a:endParaRPr lang="es-ES" sz="1100" b="0" i="0" u="none" strike="noStrike">
+                      <a:endParaRPr lang="es-ES" sz="1100" b="0" i="0" u="none" strike="noStrike" dirty="0">
                         <a:solidFill>
                           <a:srgbClr val="000000"/>
                         </a:solidFill>
@@ -19338,12 +20209,12 @@
                     <a:p>
                       <a:pPr algn="l" fontAlgn="ctr"/>
                       <a:r>
-                        <a:rPr lang="es-ES" sz="1100" u="none" strike="noStrike">
+                        <a:rPr lang="es-ES" sz="1100" u="none" strike="noStrike" dirty="0">
                           <a:effectLst/>
                         </a:rPr>
                         <a:t>Excelente</a:t>
                       </a:r>
-                      <a:endParaRPr lang="es-ES" sz="1100" b="0" i="0" u="none" strike="noStrike">
+                      <a:endParaRPr lang="es-ES" sz="1100" b="0" i="0" u="none" strike="noStrike" dirty="0">
                         <a:solidFill>
                           <a:srgbClr val="000000"/>
                         </a:solidFill>
@@ -19391,12 +20262,12 @@
                     <a:p>
                       <a:pPr algn="l" fontAlgn="ctr"/>
                       <a:r>
-                        <a:rPr lang="es-ES" sz="1100" u="none" strike="noStrike">
+                        <a:rPr lang="es-ES" sz="1100" u="none" strike="noStrike" dirty="0">
                           <a:effectLst/>
                         </a:rPr>
                         <a:t>Excelente</a:t>
                       </a:r>
-                      <a:endParaRPr lang="es-ES" sz="1100" b="0" i="0" u="none" strike="noStrike">
+                      <a:endParaRPr lang="es-ES" sz="1100" b="0" i="0" u="none" strike="noStrike" dirty="0">
                         <a:solidFill>
                           <a:srgbClr val="000000"/>
                         </a:solidFill>
@@ -19414,12 +20285,12 @@
                     <a:p>
                       <a:pPr algn="l" fontAlgn="ctr"/>
                       <a:r>
-                        <a:rPr lang="es-ES" sz="1100" u="none" strike="noStrike">
+                        <a:rPr lang="es-ES" sz="1100" u="none" strike="noStrike" dirty="0">
                           <a:effectLst/>
                         </a:rPr>
                         <a:t>Excelente</a:t>
                       </a:r>
-                      <a:endParaRPr lang="es-ES" sz="1100" b="0" i="0" u="none" strike="noStrike">
+                      <a:endParaRPr lang="es-ES" sz="1100" b="0" i="0" u="none" strike="noStrike" dirty="0">
                         <a:solidFill>
                           <a:srgbClr val="000000"/>
                         </a:solidFill>
@@ -19562,7 +20433,7 @@
           <a:p>
             <a:r>
               <a:rPr lang="es-ES" sz="1400" dirty="0"/>
-              <a:t>Evaluación de algoritmos</a:t>
+              <a:t>Evaluación de algoritmos [0,1]</a:t>
             </a:r>
           </a:p>
           <a:p>
@@ -19751,8 +20622,8 @@
           </a:p>
         </p:txBody>
       </p:sp>
-      <mc:AlternateContent xmlns:mc="http://schemas.openxmlformats.org/markup-compatibility/2006" xmlns:a14="http://schemas.microsoft.com/office/drawing/2010/main">
-        <mc:Choice Requires="a14">
+      <mc:AlternateContent xmlns:mc="http://schemas.openxmlformats.org/markup-compatibility/2006">
+        <mc:Choice xmlns:a14="http://schemas.microsoft.com/office/drawing/2010/main" Requires="a14">
           <p:sp>
             <p:nvSpPr>
               <p:cNvPr id="6" name="CuadroTexto 5">
@@ -19882,7 +20753,7 @@
                 </a:pPr>
                 <a:r>
                   <a:rPr lang="es-ES" sz="1400" dirty="0"/>
-                  <a:t>Se valor ponderado a aplicar para la similitud de el algoritmo i, como </a:t>
+                  <a:t>Se calcula el valor de similitud ponderada a aplicar para la similitud de el algoritmo i, como </a:t>
                 </a:r>
                 <a14:m>
                   <m:oMath xmlns:m="http://schemas.openxmlformats.org/officeDocument/2006/math">
@@ -19899,7 +20770,7 @@
                           <a:rPr lang="es-ES" sz="1400" b="0" i="1" smtClean="0">
                             <a:latin typeface="Cambria Math" panose="02040503050406030204" pitchFamily="18" charset="0"/>
                           </a:rPr>
-                          <m:t>𝑉</m:t>
+                          <m:t>𝑆𝑃</m:t>
                         </m:r>
                         <m:r>
                           <a:rPr lang="es-ES" sz="1400" b="0" i="1" smtClean="0">
@@ -19994,10 +20865,10 @@
                       </m:sSubPr>
                       <m:e>
                         <m:r>
-                          <a:rPr lang="es-ES" sz="1400" i="1">
+                          <a:rPr lang="es-ES" sz="1400" b="0" i="1" smtClean="0">
                             <a:latin typeface="Cambria Math" panose="02040503050406030204" pitchFamily="18" charset="0"/>
                           </a:rPr>
-                          <m:t>𝑉</m:t>
+                          <m:t>𝑆𝑃</m:t>
                         </m:r>
                         <m:r>
                           <a:rPr lang="es-ES" sz="1400" i="1">
@@ -20177,7 +21048,7 @@
             </p:txBody>
           </p:sp>
         </mc:Choice>
-        <mc:Fallback xmlns="">
+        <mc:Fallback>
           <p:sp>
             <p:nvSpPr>
               <p:cNvPr id="6" name="CuadroTexto 5">
@@ -20201,7 +21072,7 @@
                 <a:avLst/>
               </a:prstGeom>
               <a:blipFill>
-                <a:blip r:embed="rId2"/>
+                <a:blip r:embed="rId3"/>
                 <a:stretch>
                   <a:fillRect l="-852" t="-1758" b="-15604"/>
                 </a:stretch>
@@ -21711,12 +22582,6 @@
 </file>
 
 <file path=customXml/item1.xml><?xml version="1.0" encoding="utf-8"?>
-<p:properties xmlns:p="http://schemas.microsoft.com/office/2006/metadata/properties" xmlns:xsi="http://www.w3.org/2001/XMLSchema-instance" xmlns:pc="http://schemas.microsoft.com/office/infopath/2007/PartnerControls">
-  <documentManagement/>
-</p:properties>
-</file>
-
-<file path=customXml/item2.xml><?xml version="1.0" encoding="utf-8"?>
 <ct:contentTypeSchema xmlns:ct="http://schemas.microsoft.com/office/2006/metadata/contentType" xmlns:ma="http://schemas.microsoft.com/office/2006/metadata/properties/metaAttributes" ct:_="" ma:_="" ma:contentTypeName="Documento" ma:contentTypeID="0x010100BFA83BC710E73B4EAC2B8AFF8EC01DA8" ma:contentTypeVersion="2" ma:contentTypeDescription="Crear nuevo documento." ma:contentTypeScope="" ma:versionID="d947bd648ad5c44f6fd641dfc1748c72">
   <xsd:schema xmlns:xsd="http://www.w3.org/2001/XMLSchema" xmlns:xs="http://www.w3.org/2001/XMLSchema" xmlns:p="http://schemas.microsoft.com/office/2006/metadata/properties" xmlns:ns2="e175f0af-9b45-48b7-8f66-de0a21637dd8" targetNamespace="http://schemas.microsoft.com/office/2006/metadata/properties" ma:root="true" ma:fieldsID="c31ce7a597295899024a237e47cb5913" ns2:_="">
     <xsd:import namespace="e175f0af-9b45-48b7-8f66-de0a21637dd8"/>
@@ -21848,6 +22713,12 @@
 </ct:contentTypeSchema>
 </file>
 
+<file path=customXml/item2.xml><?xml version="1.0" encoding="utf-8"?>
+<p:properties xmlns:p="http://schemas.microsoft.com/office/2006/metadata/properties" xmlns:xsi="http://www.w3.org/2001/XMLSchema-instance" xmlns:pc="http://schemas.microsoft.com/office/infopath/2007/PartnerControls">
+  <documentManagement/>
+</p:properties>
+</file>
+
 <file path=customXml/item3.xml><?xml version="1.0" encoding="utf-8"?>
 <?mso-contentType ?>
 <FormTemplates xmlns="http://schemas.microsoft.com/sharepoint/v3/contenttype/forms">
@@ -21858,22 +22729,6 @@
 </file>
 
 <file path=customXml/itemProps1.xml><?xml version="1.0" encoding="utf-8"?>
-<ds:datastoreItem xmlns:ds="http://schemas.openxmlformats.org/officeDocument/2006/customXml" ds:itemID="{0B2AC0CA-67DA-4FBD-9D44-863D62B23E74}">
-  <ds:schemaRefs>
-    <ds:schemaRef ds:uri="http://schemas.openxmlformats.org/package/2006/metadata/core-properties"/>
-    <ds:schemaRef ds:uri="http://purl.org/dc/dcmitype/"/>
-    <ds:schemaRef ds:uri="http://purl.org/dc/terms/"/>
-    <ds:schemaRef ds:uri="http://schemas.microsoft.com/office/2006/documentManagement/types"/>
-    <ds:schemaRef ds:uri="http://schemas.microsoft.com/office/2006/metadata/properties"/>
-    <ds:schemaRef ds:uri="http://purl.org/dc/elements/1.1/"/>
-    <ds:schemaRef ds:uri="http://schemas.microsoft.com/office/infopath/2007/PartnerControls"/>
-    <ds:schemaRef ds:uri="e175f0af-9b45-48b7-8f66-de0a21637dd8"/>
-    <ds:schemaRef ds:uri="http://www.w3.org/XML/1998/namespace"/>
-  </ds:schemaRefs>
-</ds:datastoreItem>
-</file>
-
-<file path=customXml/itemProps2.xml><?xml version="1.0" encoding="utf-8"?>
 <ds:datastoreItem xmlns:ds="http://schemas.openxmlformats.org/officeDocument/2006/customXml" ds:itemID="{CCE379EE-DAF1-4067-AB56-09AF5D776856}">
   <ds:schemaRefs>
     <ds:schemaRef ds:uri="http://schemas.microsoft.com/office/2006/metadata/contentType"/>
@@ -21891,6 +22746,22 @@
 </ds:datastoreItem>
 </file>
 
+<file path=customXml/itemProps2.xml><?xml version="1.0" encoding="utf-8"?>
+<ds:datastoreItem xmlns:ds="http://schemas.openxmlformats.org/officeDocument/2006/customXml" ds:itemID="{0B2AC0CA-67DA-4FBD-9D44-863D62B23E74}">
+  <ds:schemaRefs>
+    <ds:schemaRef ds:uri="e175f0af-9b45-48b7-8f66-de0a21637dd8"/>
+    <ds:schemaRef ds:uri="http://purl.org/dc/elements/1.1/"/>
+    <ds:schemaRef ds:uri="http://schemas.microsoft.com/office/2006/metadata/properties"/>
+    <ds:schemaRef ds:uri="http://purl.org/dc/terms/"/>
+    <ds:schemaRef ds:uri="http://schemas.openxmlformats.org/package/2006/metadata/core-properties"/>
+    <ds:schemaRef ds:uri="http://schemas.microsoft.com/office/2006/documentManagement/types"/>
+    <ds:schemaRef ds:uri="http://schemas.microsoft.com/office/infopath/2007/PartnerControls"/>
+    <ds:schemaRef ds:uri="http://www.w3.org/XML/1998/namespace"/>
+    <ds:schemaRef ds:uri="http://purl.org/dc/dcmitype/"/>
+  </ds:schemaRefs>
+</ds:datastoreItem>
+</file>
+
 <file path=customXml/itemProps3.xml><?xml version="1.0" encoding="utf-8"?>
 <ds:datastoreItem xmlns:ds="http://schemas.openxmlformats.org/officeDocument/2006/customXml" ds:itemID="{E4899DAF-C2D9-483D-B87F-F3B38628867D}">
   <ds:schemaRefs>

</xml_diff>